<commit_message>
Modified version of final presentation slides
</commit_message>
<xml_diff>
--- a/Course_Avail_Final.pptx
+++ b/Course_Avail_Final.pptx
@@ -7,22 +7,17 @@
     <p:sldMasterId id="2147483685" r:id="rId3"/>
   </p:sldMasterIdLst>
   <p:notesMasterIdLst>
-    <p:notesMasterId r:id="rId17"/>
+    <p:notesMasterId r:id="rId12"/>
   </p:notesMasterIdLst>
   <p:sldIdLst>
     <p:sldId id="258" r:id="rId4"/>
     <p:sldId id="265" r:id="rId5"/>
-    <p:sldId id="263" r:id="rId6"/>
-    <p:sldId id="264" r:id="rId7"/>
-    <p:sldId id="259" r:id="rId8"/>
-    <p:sldId id="260" r:id="rId9"/>
-    <p:sldId id="267" r:id="rId10"/>
-    <p:sldId id="266" r:id="rId11"/>
-    <p:sldId id="269" r:id="rId12"/>
-    <p:sldId id="261" r:id="rId13"/>
-    <p:sldId id="268" r:id="rId14"/>
-    <p:sldId id="270" r:id="rId15"/>
-    <p:sldId id="271" r:id="rId16"/>
+    <p:sldId id="274" r:id="rId6"/>
+    <p:sldId id="263" r:id="rId7"/>
+    <p:sldId id="264" r:id="rId8"/>
+    <p:sldId id="273" r:id="rId9"/>
+    <p:sldId id="275" r:id="rId10"/>
+    <p:sldId id="276" r:id="rId11"/>
   </p:sldIdLst>
   <p:sldSz cx="9144000" cy="5143500" type="screen16x9"/>
   <p:notesSz cx="6858000" cy="9144000"/>
@@ -222,7 +217,8 @@
           <a:p>
             <a:fld id="{A37281A0-962A-47F4-9481-A75AEA6E69B5}" type="datetimeFigureOut">
               <a:rPr lang="en-US" smtClean="0"/>
-              <a:t>12/3/13</a:t>
+              <a:pPr/>
+              <a:t>12/9/13</a:t>
             </a:fld>
             <a:endParaRPr lang="en-US"/>
           </a:p>
@@ -381,6 +377,7 @@
           <a:p>
             <a:fld id="{3485A29B-357A-4063-A4EA-E6DDBC92BB77}" type="slidenum">
               <a:rPr lang="en-US" smtClean="0"/>
+              <a:pPr/>
               <a:t>‹#›</a:t>
             </a:fld>
             <a:endParaRPr lang="en-US"/>
@@ -563,7 +560,8 @@
           <a:p>
             <a:fld id="{3485A29B-357A-4063-A4EA-E6DDBC92BB77}" type="slidenum">
               <a:rPr lang="en-US" smtClean="0"/>
-              <a:t>4</a:t>
+              <a:pPr/>
+              <a:t>5</a:t>
             </a:fld>
             <a:endParaRPr lang="en-US"/>
           </a:p>
@@ -865,7 +863,8 @@
           <a:p>
             <a:fld id="{B01F9CA3-105E-4857-9057-6DB6197DA786}" type="datetimeFigureOut">
               <a:rPr lang="en-US" smtClean="0"/>
-              <a:t>12/3/13</a:t>
+              <a:pPr/>
+              <a:t>12/9/13</a:t>
             </a:fld>
             <a:endParaRPr lang="en-US"/>
           </a:p>
@@ -907,6 +906,7 @@
           <a:p>
             <a:fld id="{7F5CE407-6216-4202-80E4-A30DC2F709B2}" type="slidenum">
               <a:rPr lang="en-US" smtClean="0"/>
+              <a:pPr/>
               <a:t>‹#›</a:t>
             </a:fld>
             <a:endParaRPr lang="en-US"/>
@@ -1057,7 +1057,8 @@
           <a:p>
             <a:fld id="{B01F9CA3-105E-4857-9057-6DB6197DA786}" type="datetimeFigureOut">
               <a:rPr lang="en-US" smtClean="0"/>
-              <a:t>12/3/13</a:t>
+              <a:pPr/>
+              <a:t>12/9/13</a:t>
             </a:fld>
             <a:endParaRPr lang="en-US"/>
           </a:p>
@@ -1099,6 +1100,7 @@
           <a:p>
             <a:fld id="{7F5CE407-6216-4202-80E4-A30DC2F709B2}" type="slidenum">
               <a:rPr lang="en-US" smtClean="0"/>
+              <a:pPr/>
               <a:t>‹#›</a:t>
             </a:fld>
             <a:endParaRPr lang="en-US"/>
@@ -1326,7 +1328,8 @@
           <a:p>
             <a:fld id="{B01F9CA3-105E-4857-9057-6DB6197DA786}" type="datetimeFigureOut">
               <a:rPr lang="en-US" smtClean="0"/>
-              <a:t>12/3/13</a:t>
+              <a:pPr/>
+              <a:t>12/9/13</a:t>
             </a:fld>
             <a:endParaRPr lang="en-US"/>
           </a:p>
@@ -1368,6 +1371,7 @@
           <a:p>
             <a:fld id="{7F5CE407-6216-4202-80E4-A30DC2F709B2}" type="slidenum">
               <a:rPr lang="en-US" smtClean="0"/>
+              <a:pPr/>
               <a:t>‹#›</a:t>
             </a:fld>
             <a:endParaRPr lang="en-US"/>
@@ -1505,7 +1509,8 @@
           <a:p>
             <a:fld id="{B01F9CA3-105E-4857-9057-6DB6197DA786}" type="datetimeFigureOut">
               <a:rPr lang="en-US" smtClean="0"/>
-              <a:t>12/3/13</a:t>
+              <a:pPr/>
+              <a:t>12/9/13</a:t>
             </a:fld>
             <a:endParaRPr lang="en-US"/>
           </a:p>
@@ -1547,6 +1552,7 @@
           <a:p>
             <a:fld id="{7F5CE407-6216-4202-80E4-A30DC2F709B2}" type="slidenum">
               <a:rPr lang="en-US" smtClean="0"/>
+              <a:pPr/>
               <a:t>‹#›</a:t>
             </a:fld>
             <a:endParaRPr lang="en-US"/>
@@ -1700,7 +1706,7 @@
                 <a:latin typeface="Calibri"/>
               </a:rPr>
               <a:pPr/>
-              <a:t>12/3/13</a:t>
+              <a:t>12/9/13</a:t>
             </a:fld>
             <a:endParaRPr lang="en-US">
               <a:solidFill>
@@ -1907,7 +1913,7 @@
                 <a:latin typeface="Calibri"/>
               </a:rPr>
               <a:pPr/>
-              <a:t>12/3/13</a:t>
+              <a:t>12/9/13</a:t>
             </a:fld>
             <a:endParaRPr lang="en-US">
               <a:solidFill>
@@ -2190,7 +2196,7 @@
                 <a:latin typeface="Calibri"/>
               </a:rPr>
               <a:pPr/>
-              <a:t>12/3/13</a:t>
+              <a:t>12/9/13</a:t>
             </a:fld>
             <a:endParaRPr lang="en-US">
               <a:solidFill>
@@ -2459,7 +2465,7 @@
                 <a:latin typeface="Calibri"/>
               </a:rPr>
               <a:pPr/>
-              <a:t>12/3/13</a:t>
+              <a:t>12/9/13</a:t>
             </a:fld>
             <a:endParaRPr lang="en-US">
               <a:solidFill>
@@ -2863,7 +2869,7 @@
                 <a:latin typeface="Calibri"/>
               </a:rPr>
               <a:pPr/>
-              <a:t>12/3/13</a:t>
+              <a:t>12/9/13</a:t>
             </a:fld>
             <a:endParaRPr lang="en-US">
               <a:solidFill>
@@ -3018,7 +3024,7 @@
                 <a:latin typeface="Calibri"/>
               </a:rPr>
               <a:pPr/>
-              <a:t>12/3/13</a:t>
+              <a:t>12/9/13</a:t>
             </a:fld>
             <a:endParaRPr lang="en-US">
               <a:solidFill>
@@ -3150,7 +3156,7 @@
                 <a:latin typeface="Calibri"/>
               </a:rPr>
               <a:pPr/>
-              <a:t>12/3/13</a:t>
+              <a:t>12/9/13</a:t>
             </a:fld>
             <a:endParaRPr lang="en-US">
               <a:solidFill>
@@ -3353,7 +3359,8 @@
           <a:p>
             <a:fld id="{B01F9CA3-105E-4857-9057-6DB6197DA786}" type="datetimeFigureOut">
               <a:rPr lang="en-US" smtClean="0"/>
-              <a:t>12/3/13</a:t>
+              <a:pPr/>
+              <a:t>12/9/13</a:t>
             </a:fld>
             <a:endParaRPr lang="en-US"/>
           </a:p>
@@ -3395,6 +3402,7 @@
           <a:p>
             <a:fld id="{7F5CE407-6216-4202-80E4-A30DC2F709B2}" type="slidenum">
               <a:rPr lang="en-US" smtClean="0"/>
+              <a:pPr/>
               <a:t>‹#›</a:t>
             </a:fld>
             <a:endParaRPr lang="en-US"/>
@@ -3633,7 +3641,7 @@
                 <a:latin typeface="Calibri"/>
               </a:rPr>
               <a:pPr/>
-              <a:t>12/3/13</a:t>
+              <a:t>12/9/13</a:t>
             </a:fld>
             <a:endParaRPr lang="en-US">
               <a:solidFill>
@@ -3923,7 +3931,7 @@
                 <a:latin typeface="Calibri"/>
               </a:rPr>
               <a:pPr/>
-              <a:t>12/3/13</a:t>
+              <a:t>12/9/13</a:t>
             </a:fld>
             <a:endParaRPr lang="en-US">
               <a:solidFill>
@@ -4130,7 +4138,7 @@
                 <a:latin typeface="Calibri"/>
               </a:rPr>
               <a:pPr/>
-              <a:t>12/3/13</a:t>
+              <a:t>12/9/13</a:t>
             </a:fld>
             <a:endParaRPr lang="en-US">
               <a:solidFill>
@@ -4347,7 +4355,7 @@
                 <a:latin typeface="Calibri"/>
               </a:rPr>
               <a:pPr/>
-              <a:t>12/3/13</a:t>
+              <a:t>12/9/13</a:t>
             </a:fld>
             <a:endParaRPr lang="en-US">
               <a:solidFill>
@@ -4576,7 +4584,7 @@
                 <a:latin typeface="Calibri"/>
               </a:rPr>
               <a:pPr/>
-              <a:t>12/3/13</a:t>
+              <a:t>12/9/13</a:t>
             </a:fld>
             <a:endParaRPr lang="en-US">
               <a:solidFill>
@@ -4783,7 +4791,7 @@
                 <a:latin typeface="Calibri"/>
               </a:rPr>
               <a:pPr/>
-              <a:t>12/3/13</a:t>
+              <a:t>12/9/13</a:t>
             </a:fld>
             <a:endParaRPr lang="en-US">
               <a:solidFill>
@@ -5066,7 +5074,7 @@
                 <a:latin typeface="Calibri"/>
               </a:rPr>
               <a:pPr/>
-              <a:t>12/3/13</a:t>
+              <a:t>12/9/13</a:t>
             </a:fld>
             <a:endParaRPr lang="en-US">
               <a:solidFill>
@@ -5335,7 +5343,7 @@
                 <a:latin typeface="Calibri"/>
               </a:rPr>
               <a:pPr/>
-              <a:t>12/3/13</a:t>
+              <a:t>12/9/13</a:t>
             </a:fld>
             <a:endParaRPr lang="en-US">
               <a:solidFill>
@@ -5739,7 +5747,7 @@
                 <a:latin typeface="Calibri"/>
               </a:rPr>
               <a:pPr/>
-              <a:t>12/3/13</a:t>
+              <a:t>12/9/13</a:t>
             </a:fld>
             <a:endParaRPr lang="en-US">
               <a:solidFill>
@@ -5894,7 +5902,7 @@
                 <a:latin typeface="Calibri"/>
               </a:rPr>
               <a:pPr/>
-              <a:t>12/3/13</a:t>
+              <a:t>12/9/13</a:t>
             </a:fld>
             <a:endParaRPr lang="en-US">
               <a:solidFill>
@@ -6170,7 +6178,8 @@
           <a:p>
             <a:fld id="{B01F9CA3-105E-4857-9057-6DB6197DA786}" type="datetimeFigureOut">
               <a:rPr lang="en-US" smtClean="0"/>
-              <a:t>12/3/13</a:t>
+              <a:pPr/>
+              <a:t>12/9/13</a:t>
             </a:fld>
             <a:endParaRPr lang="en-US"/>
           </a:p>
@@ -6212,6 +6221,7 @@
           <a:p>
             <a:fld id="{7F5CE407-6216-4202-80E4-A30DC2F709B2}" type="slidenum">
               <a:rPr lang="en-US" smtClean="0"/>
+              <a:pPr/>
               <a:t>‹#›</a:t>
             </a:fld>
             <a:endParaRPr lang="en-US"/>
@@ -6345,7 +6355,7 @@
                 <a:latin typeface="Calibri"/>
               </a:rPr>
               <a:pPr/>
-              <a:t>12/3/13</a:t>
+              <a:t>12/9/13</a:t>
             </a:fld>
             <a:endParaRPr lang="en-US">
               <a:solidFill>
@@ -6659,7 +6669,7 @@
                 <a:latin typeface="Calibri"/>
               </a:rPr>
               <a:pPr/>
-              <a:t>12/3/13</a:t>
+              <a:t>12/9/13</a:t>
             </a:fld>
             <a:endParaRPr lang="en-US">
               <a:solidFill>
@@ -6949,7 +6959,7 @@
                 <a:latin typeface="Calibri"/>
               </a:rPr>
               <a:pPr/>
-              <a:t>12/3/13</a:t>
+              <a:t>12/9/13</a:t>
             </a:fld>
             <a:endParaRPr lang="en-US">
               <a:solidFill>
@@ -7156,7 +7166,7 @@
                 <a:latin typeface="Calibri"/>
               </a:rPr>
               <a:pPr/>
-              <a:t>12/3/13</a:t>
+              <a:t>12/9/13</a:t>
             </a:fld>
             <a:endParaRPr lang="en-US">
               <a:solidFill>
@@ -7373,7 +7383,7 @@
                 <a:latin typeface="Calibri"/>
               </a:rPr>
               <a:pPr/>
-              <a:t>12/3/13</a:t>
+              <a:t>12/9/13</a:t>
             </a:fld>
             <a:endParaRPr lang="en-US">
               <a:solidFill>
@@ -7653,7 +7663,8 @@
           <a:p>
             <a:fld id="{B01F9CA3-105E-4857-9057-6DB6197DA786}" type="datetimeFigureOut">
               <a:rPr lang="en-US" smtClean="0"/>
-              <a:t>12/3/13</a:t>
+              <a:pPr/>
+              <a:t>12/9/13</a:t>
             </a:fld>
             <a:endParaRPr lang="en-US"/>
           </a:p>
@@ -7695,6 +7706,7 @@
           <a:p>
             <a:fld id="{7F5CE407-6216-4202-80E4-A30DC2F709B2}" type="slidenum">
               <a:rPr lang="en-US" smtClean="0"/>
+              <a:pPr/>
               <a:t>‹#›</a:t>
             </a:fld>
             <a:endParaRPr lang="en-US"/>
@@ -7951,7 +7963,8 @@
           <a:p>
             <a:fld id="{B01F9CA3-105E-4857-9057-6DB6197DA786}" type="datetimeFigureOut">
               <a:rPr lang="en-US" smtClean="0"/>
-              <a:t>12/3/13</a:t>
+              <a:pPr/>
+              <a:t>12/9/13</a:t>
             </a:fld>
             <a:endParaRPr lang="en-US"/>
           </a:p>
@@ -7993,6 +8006,7 @@
           <a:p>
             <a:fld id="{7F5CE407-6216-4202-80E4-A30DC2F709B2}" type="slidenum">
               <a:rPr lang="en-US" smtClean="0"/>
+              <a:pPr/>
               <a:t>‹#›</a:t>
             </a:fld>
             <a:endParaRPr lang="en-US"/>
@@ -8407,7 +8421,8 @@
           <a:p>
             <a:fld id="{B01F9CA3-105E-4857-9057-6DB6197DA786}" type="datetimeFigureOut">
               <a:rPr lang="en-US" smtClean="0"/>
-              <a:t>12/3/13</a:t>
+              <a:pPr/>
+              <a:t>12/9/13</a:t>
             </a:fld>
             <a:endParaRPr lang="en-US"/>
           </a:p>
@@ -8449,6 +8464,7 @@
           <a:p>
             <a:fld id="{7F5CE407-6216-4202-80E4-A30DC2F709B2}" type="slidenum">
               <a:rPr lang="en-US" smtClean="0"/>
+              <a:pPr/>
               <a:t>‹#›</a:t>
             </a:fld>
             <a:endParaRPr lang="en-US"/>
@@ -8520,7 +8536,8 @@
           <a:p>
             <a:fld id="{B01F9CA3-105E-4857-9057-6DB6197DA786}" type="datetimeFigureOut">
               <a:rPr lang="en-US" smtClean="0"/>
-              <a:t>12/3/13</a:t>
+              <a:pPr/>
+              <a:t>12/9/13</a:t>
             </a:fld>
             <a:endParaRPr lang="en-US"/>
           </a:p>
@@ -8562,6 +8579,7 @@
           <a:p>
             <a:fld id="{7F5CE407-6216-4202-80E4-A30DC2F709B2}" type="slidenum">
               <a:rPr lang="en-US" smtClean="0"/>
+              <a:pPr/>
               <a:t>‹#›</a:t>
             </a:fld>
             <a:endParaRPr lang="en-US"/>
@@ -8610,7 +8628,8 @@
           <a:p>
             <a:fld id="{B01F9CA3-105E-4857-9057-6DB6197DA786}" type="datetimeFigureOut">
               <a:rPr lang="en-US" smtClean="0"/>
-              <a:t>12/3/13</a:t>
+              <a:pPr/>
+              <a:t>12/9/13</a:t>
             </a:fld>
             <a:endParaRPr lang="en-US"/>
           </a:p>
@@ -8652,6 +8671,7 @@
           <a:p>
             <a:fld id="{7F5CE407-6216-4202-80E4-A30DC2F709B2}" type="slidenum">
               <a:rPr lang="en-US" smtClean="0"/>
+              <a:pPr/>
               <a:t>‹#›</a:t>
             </a:fld>
             <a:endParaRPr lang="en-US"/>
@@ -8892,7 +8912,8 @@
           <a:p>
             <a:fld id="{B01F9CA3-105E-4857-9057-6DB6197DA786}" type="datetimeFigureOut">
               <a:rPr lang="en-US" smtClean="0"/>
-              <a:t>12/3/13</a:t>
+              <a:pPr/>
+              <a:t>12/9/13</a:t>
             </a:fld>
             <a:endParaRPr lang="en-US"/>
           </a:p>
@@ -8934,6 +8955,7 @@
           <a:p>
             <a:fld id="{7F5CE407-6216-4202-80E4-A30DC2F709B2}" type="slidenum">
               <a:rPr lang="en-US" smtClean="0"/>
+              <a:pPr/>
               <a:t>‹#›</a:t>
             </a:fld>
             <a:endParaRPr lang="en-US"/>
@@ -8954,8 +8976,8 @@
     <p:bg>
       <p:bgPr>
         <a:solidFill>
-          <a:srgbClr val="C8FFD8">
-            <a:alpha val="66000"/>
+          <a:srgbClr val="A7FFC0">
+            <a:alpha val="24000"/>
           </a:srgbClr>
         </a:solidFill>
         <a:effectLst/>
@@ -9103,7 +9125,8 @@
           <a:p>
             <a:fld id="{B01F9CA3-105E-4857-9057-6DB6197DA786}" type="datetimeFigureOut">
               <a:rPr lang="en-US" smtClean="0"/>
-              <a:t>12/3/13</a:t>
+              <a:pPr/>
+              <a:t>12/9/13</a:t>
             </a:fld>
             <a:endParaRPr lang="en-US"/>
           </a:p>
@@ -9177,6 +9200,7 @@
           <a:p>
             <a:fld id="{7F5CE407-6216-4202-80E4-A30DC2F709B2}" type="slidenum">
               <a:rPr lang="en-US" smtClean="0"/>
+              <a:pPr/>
               <a:t>‹#›</a:t>
             </a:fld>
             <a:endParaRPr lang="en-US"/>
@@ -9541,8 +9565,8 @@
     <p:bg>
       <p:bgPr>
         <a:solidFill>
-          <a:srgbClr val="C8FFD8">
-            <a:alpha val="66000"/>
+          <a:srgbClr val="A7FFC0">
+            <a:alpha val="24000"/>
           </a:srgbClr>
         </a:solidFill>
         <a:effectLst/>
@@ -9701,7 +9725,7 @@
                 <a:latin typeface="Calibri"/>
               </a:rPr>
               <a:pPr defTabSz="685783"/>
-              <a:t>12/3/13</a:t>
+              <a:t>12/9/13</a:t>
             </a:fld>
             <a:endParaRPr lang="en-US">
               <a:solidFill>
@@ -10124,9 +10148,14 @@
 <p:sldMaster xmlns:a="http://schemas.openxmlformats.org/drawingml/2006/main" xmlns:r="http://schemas.openxmlformats.org/officeDocument/2006/relationships" xmlns:p="http://schemas.openxmlformats.org/presentationml/2006/main">
   <p:cSld>
     <p:bg>
-      <p:bgRef idx="1001">
-        <a:schemeClr val="bg1"/>
-      </p:bgRef>
+      <p:bgPr>
+        <a:solidFill>
+          <a:srgbClr val="A7FFC0">
+            <a:alpha val="24000"/>
+          </a:srgbClr>
+        </a:solidFill>
+        <a:effectLst/>
+      </p:bgPr>
     </p:bg>
     <p:spTree>
       <p:nvGrpSpPr>
@@ -10281,7 +10310,7 @@
                 <a:latin typeface="Calibri"/>
               </a:rPr>
               <a:pPr defTabSz="685800"/>
-              <a:t>12/3/13</a:t>
+              <a:t>12/9/13</a:t>
             </a:fld>
             <a:endParaRPr lang="en-US">
               <a:solidFill>
@@ -11076,287 +11105,9 @@
 </p:sld>
 </file>
 
-<file path=ppt/slides/slide10.xml><?xml version="1.0" encoding="utf-8"?>
-<p:sld xmlns:a="http://schemas.openxmlformats.org/drawingml/2006/main" xmlns:r="http://schemas.openxmlformats.org/officeDocument/2006/relationships" xmlns:p="http://schemas.openxmlformats.org/presentationml/2006/main">
-  <p:cSld>
-    <p:spTree>
-      <p:nvGrpSpPr>
-        <p:cNvPr id="1" name=""/>
-        <p:cNvGrpSpPr/>
-        <p:nvPr/>
-      </p:nvGrpSpPr>
-      <p:grpSpPr>
-        <a:xfrm>
-          <a:off x="0" y="0"/>
-          <a:ext cx="0" cy="0"/>
-          <a:chOff x="0" y="0"/>
-          <a:chExt cx="0" cy="0"/>
-        </a:xfrm>
-      </p:grpSpPr>
-      <p:pic>
-        <p:nvPicPr>
-          <p:cNvPr id="2" name="Picture 1" descr="ICS.jpg"/>
-          <p:cNvPicPr>
-            <a:picLocks noChangeAspect="1"/>
-          </p:cNvPicPr>
-          <p:nvPr/>
-        </p:nvPicPr>
-        <p:blipFill>
-          <a:blip r:embed="rId2">
-            <a:extLst>
-              <a:ext uri="{28A0092B-C50C-407E-A947-70E740481C1C}">
-                <a14:useLocalDpi xmlns:a14="http://schemas.microsoft.com/office/drawing/2010/main" val="0"/>
-              </a:ext>
-            </a:extLst>
-          </a:blip>
-          <a:stretch>
-            <a:fillRect/>
-          </a:stretch>
-        </p:blipFill>
-        <p:spPr>
-          <a:xfrm>
-            <a:off x="410308" y="304800"/>
-            <a:ext cx="8381424" cy="4149969"/>
-          </a:xfrm>
-          <a:prstGeom prst="rect">
-            <a:avLst/>
-          </a:prstGeom>
-        </p:spPr>
-      </p:pic>
-    </p:spTree>
-    <p:extLst>
-      <p:ext uri="{BB962C8B-B14F-4D97-AF65-F5344CB8AC3E}">
-        <p14:creationId xmlns:p14="http://schemas.microsoft.com/office/powerpoint/2010/main" val="2710815373"/>
-      </p:ext>
-    </p:extLst>
-  </p:cSld>
-  <p:clrMapOvr>
-    <a:masterClrMapping/>
-  </p:clrMapOvr>
-  <p:timing>
-    <p:tnLst>
-      <p:par>
-        <p:cTn xmlns:p14="http://schemas.microsoft.com/office/powerpoint/2010/main" id="1" dur="indefinite" restart="never" nodeType="tmRoot"/>
-      </p:par>
-    </p:tnLst>
-  </p:timing>
-</p:sld>
-</file>
-
-<file path=ppt/slides/slide11.xml><?xml version="1.0" encoding="utf-8"?>
-<p:sld xmlns:a="http://schemas.openxmlformats.org/drawingml/2006/main" xmlns:r="http://schemas.openxmlformats.org/officeDocument/2006/relationships" xmlns:p="http://schemas.openxmlformats.org/presentationml/2006/main">
-  <p:cSld>
-    <p:spTree>
-      <p:nvGrpSpPr>
-        <p:cNvPr id="1" name=""/>
-        <p:cNvGrpSpPr/>
-        <p:nvPr/>
-      </p:nvGrpSpPr>
-      <p:grpSpPr>
-        <a:xfrm>
-          <a:off x="0" y="0"/>
-          <a:ext cx="0" cy="0"/>
-          <a:chOff x="0" y="0"/>
-          <a:chExt cx="0" cy="0"/>
-        </a:xfrm>
-      </p:grpSpPr>
-      <p:pic>
-        <p:nvPicPr>
-          <p:cNvPr id="3" name="Picture 2" descr="Math.jpg"/>
-          <p:cNvPicPr>
-            <a:picLocks noChangeAspect="1"/>
-          </p:cNvPicPr>
-          <p:nvPr/>
-        </p:nvPicPr>
-        <p:blipFill>
-          <a:blip r:embed="rId2">
-            <a:extLst>
-              <a:ext uri="{28A0092B-C50C-407E-A947-70E740481C1C}">
-                <a14:useLocalDpi xmlns:a14="http://schemas.microsoft.com/office/drawing/2010/main" val="0"/>
-              </a:ext>
-            </a:extLst>
-          </a:blip>
-          <a:stretch>
-            <a:fillRect/>
-          </a:stretch>
-        </p:blipFill>
-        <p:spPr>
-          <a:xfrm>
-            <a:off x="488461" y="304800"/>
-            <a:ext cx="8215374" cy="4062046"/>
-          </a:xfrm>
-          <a:prstGeom prst="rect">
-            <a:avLst/>
-          </a:prstGeom>
-        </p:spPr>
-      </p:pic>
-    </p:spTree>
-    <p:extLst>
-      <p:ext uri="{BB962C8B-B14F-4D97-AF65-F5344CB8AC3E}">
-        <p14:creationId xmlns:p14="http://schemas.microsoft.com/office/powerpoint/2010/main" val="3401675801"/>
-      </p:ext>
-    </p:extLst>
-  </p:cSld>
-  <p:clrMapOvr>
-    <a:masterClrMapping/>
-  </p:clrMapOvr>
-  <p:timing>
-    <p:tnLst>
-      <p:par>
-        <p:cTn xmlns:p14="http://schemas.microsoft.com/office/powerpoint/2010/main" id="1" dur="indefinite" restart="never" nodeType="tmRoot"/>
-      </p:par>
-    </p:tnLst>
-  </p:timing>
-</p:sld>
-</file>
-
-<file path=ppt/slides/slide12.xml><?xml version="1.0" encoding="utf-8"?>
-<p:sld xmlns:a="http://schemas.openxmlformats.org/drawingml/2006/main" xmlns:r="http://schemas.openxmlformats.org/officeDocument/2006/relationships" xmlns:p="http://schemas.openxmlformats.org/presentationml/2006/main">
-  <p:cSld>
-    <p:spTree>
-      <p:nvGrpSpPr>
-        <p:cNvPr id="1" name=""/>
-        <p:cNvGrpSpPr/>
-        <p:nvPr/>
-      </p:nvGrpSpPr>
-      <p:grpSpPr>
-        <a:xfrm>
-          <a:off x="0" y="0"/>
-          <a:ext cx="0" cy="0"/>
-          <a:chOff x="0" y="0"/>
-          <a:chExt cx="0" cy="0"/>
-        </a:xfrm>
-      </p:grpSpPr>
-      <p:pic>
-        <p:nvPicPr>
-          <p:cNvPr id="2" name="Picture 1" descr="Settings.jpg"/>
-          <p:cNvPicPr>
-            <a:picLocks noChangeAspect="1"/>
-          </p:cNvPicPr>
-          <p:nvPr/>
-        </p:nvPicPr>
-        <p:blipFill>
-          <a:blip r:embed="rId2">
-            <a:extLst>
-              <a:ext uri="{28A0092B-C50C-407E-A947-70E740481C1C}">
-                <a14:useLocalDpi xmlns:a14="http://schemas.microsoft.com/office/drawing/2010/main" val="0"/>
-              </a:ext>
-            </a:extLst>
-          </a:blip>
-          <a:stretch>
-            <a:fillRect/>
-          </a:stretch>
-        </p:blipFill>
-        <p:spPr>
-          <a:xfrm>
-            <a:off x="293077" y="752231"/>
-            <a:ext cx="8460154" cy="3624384"/>
-          </a:xfrm>
-          <a:prstGeom prst="rect">
-            <a:avLst/>
-          </a:prstGeom>
-        </p:spPr>
-      </p:pic>
-    </p:spTree>
-    <p:extLst>
-      <p:ext uri="{BB962C8B-B14F-4D97-AF65-F5344CB8AC3E}">
-        <p14:creationId xmlns:p14="http://schemas.microsoft.com/office/powerpoint/2010/main" val="2244844797"/>
-      </p:ext>
-    </p:extLst>
-  </p:cSld>
-  <p:clrMapOvr>
-    <a:masterClrMapping/>
-  </p:clrMapOvr>
-  <p:timing>
-    <p:tnLst>
-      <p:par>
-        <p:cTn xmlns:p14="http://schemas.microsoft.com/office/powerpoint/2010/main" id="1" dur="indefinite" restart="never" nodeType="tmRoot"/>
-      </p:par>
-    </p:tnLst>
-  </p:timing>
-</p:sld>
-</file>
-
-<file path=ppt/slides/slide13.xml><?xml version="1.0" encoding="utf-8"?>
-<p:sld xmlns:a="http://schemas.openxmlformats.org/drawingml/2006/main" xmlns:r="http://schemas.openxmlformats.org/officeDocument/2006/relationships" xmlns:p="http://schemas.openxmlformats.org/presentationml/2006/main">
-  <p:cSld>
-    <p:spTree>
-      <p:nvGrpSpPr>
-        <p:cNvPr id="1" name=""/>
-        <p:cNvGrpSpPr/>
-        <p:nvPr/>
-      </p:nvGrpSpPr>
-      <p:grpSpPr>
-        <a:xfrm>
-          <a:off x="0" y="0"/>
-          <a:ext cx="0" cy="0"/>
-          <a:chOff x="0" y="0"/>
-          <a:chExt cx="0" cy="0"/>
-        </a:xfrm>
-      </p:grpSpPr>
-      <p:pic>
-        <p:nvPicPr>
-          <p:cNvPr id="3" name="Picture 2" descr="Help.jpg"/>
-          <p:cNvPicPr>
-            <a:picLocks noChangeAspect="1"/>
-          </p:cNvPicPr>
-          <p:nvPr/>
-        </p:nvPicPr>
-        <p:blipFill>
-          <a:blip r:embed="rId2">
-            <a:extLst>
-              <a:ext uri="{28A0092B-C50C-407E-A947-70E740481C1C}">
-                <a14:useLocalDpi xmlns:a14="http://schemas.microsoft.com/office/drawing/2010/main" val="0"/>
-              </a:ext>
-            </a:extLst>
-          </a:blip>
-          <a:stretch>
-            <a:fillRect/>
-          </a:stretch>
-        </p:blipFill>
-        <p:spPr>
-          <a:xfrm>
-            <a:off x="595923" y="558800"/>
-            <a:ext cx="8194036" cy="3759200"/>
-          </a:xfrm>
-          <a:prstGeom prst="rect">
-            <a:avLst/>
-          </a:prstGeom>
-        </p:spPr>
-      </p:pic>
-    </p:spTree>
-    <p:extLst>
-      <p:ext uri="{BB962C8B-B14F-4D97-AF65-F5344CB8AC3E}">
-        <p14:creationId xmlns:p14="http://schemas.microsoft.com/office/powerpoint/2010/main" val="3134586223"/>
-      </p:ext>
-    </p:extLst>
-  </p:cSld>
-  <p:clrMapOvr>
-    <a:masterClrMapping/>
-  </p:clrMapOvr>
-  <p:timing>
-    <p:tnLst>
-      <p:par>
-        <p:cTn xmlns:p14="http://schemas.microsoft.com/office/powerpoint/2010/main" id="1" dur="indefinite" restart="never" nodeType="tmRoot"/>
-      </p:par>
-    </p:tnLst>
-  </p:timing>
-</p:sld>
-</file>
-
 <file path=ppt/slides/slide2.xml><?xml version="1.0" encoding="utf-8"?>
 <p:sld xmlns:a="http://schemas.openxmlformats.org/drawingml/2006/main" xmlns:r="http://schemas.openxmlformats.org/officeDocument/2006/relationships" xmlns:p="http://schemas.openxmlformats.org/presentationml/2006/main">
   <p:cSld>
-    <p:bg>
-      <p:bgPr>
-        <a:solidFill>
-          <a:srgbClr val="C8FFD8">
-            <a:alpha val="66000"/>
-          </a:srgbClr>
-        </a:solidFill>
-        <a:effectLst/>
-      </p:bgPr>
-    </p:bg>
     <p:spTree>
       <p:nvGrpSpPr>
         <p:cNvPr id="1" name=""/>
@@ -11482,6 +11233,114 @@
       </p:grpSpPr>
       <p:sp>
         <p:nvSpPr>
+          <p:cNvPr id="4" name="Title 3"/>
+          <p:cNvSpPr>
+            <a:spLocks noGrp="1"/>
+          </p:cNvSpPr>
+          <p:nvPr>
+            <p:ph type="title"/>
+          </p:nvPr>
+        </p:nvSpPr>
+        <p:spPr/>
+        <p:txBody>
+          <a:bodyPr/>
+          <a:lstStyle/>
+          <a:p>
+            <a:r>
+              <a:rPr lang="en-US" dirty="0" smtClean="0"/>
+              <a:t>Course Availability </a:t>
+            </a:r>
+            <a:r>
+              <a:rPr lang="en-US" dirty="0" smtClean="0"/>
+              <a:t>Project – Other Goals</a:t>
+            </a:r>
+            <a:endParaRPr lang="en-US" dirty="0"/>
+          </a:p>
+        </p:txBody>
+      </p:sp>
+      <p:sp>
+        <p:nvSpPr>
+          <p:cNvPr id="5" name="Content Placeholder 4"/>
+          <p:cNvSpPr>
+            <a:spLocks noGrp="1"/>
+          </p:cNvSpPr>
+          <p:nvPr>
+            <p:ph idx="1"/>
+          </p:nvPr>
+        </p:nvSpPr>
+        <p:spPr/>
+        <p:txBody>
+          <a:bodyPr>
+            <a:noAutofit/>
+          </a:bodyPr>
+          <a:lstStyle/>
+          <a:p>
+            <a:r>
+              <a:rPr lang="en-US" sz="3000" dirty="0" smtClean="0">
+                <a:latin typeface="Calibri Light"/>
+                <a:cs typeface="Calibri Light"/>
+              </a:rPr>
+              <a:t>Improve the convenience of browsing through the courses.</a:t>
+            </a:r>
+            <a:endParaRPr lang="en-US" sz="3000" dirty="0">
+              <a:latin typeface="Calibri Light"/>
+              <a:cs typeface="Calibri Light"/>
+            </a:endParaRPr>
+          </a:p>
+          <a:p>
+            <a:r>
+              <a:rPr lang="en-US" sz="3000" dirty="0" smtClean="0">
+                <a:latin typeface="Calibri Light"/>
+                <a:cs typeface="Calibri Light"/>
+              </a:rPr>
+              <a:t>Able to search related courses etc.</a:t>
+            </a:r>
+            <a:endParaRPr lang="en-US" sz="3000" dirty="0">
+              <a:latin typeface="Calibri Light"/>
+              <a:cs typeface="Calibri Light"/>
+            </a:endParaRPr>
+          </a:p>
+        </p:txBody>
+      </p:sp>
+    </p:spTree>
+    <p:extLst>
+      <p:ext uri="{BB962C8B-B14F-4D97-AF65-F5344CB8AC3E}">
+        <p14:creationId xmlns:p14="http://schemas.microsoft.com/office/powerpoint/2010/main" val="916037840"/>
+      </p:ext>
+    </p:extLst>
+  </p:cSld>
+  <p:clrMapOvr>
+    <a:masterClrMapping/>
+  </p:clrMapOvr>
+  <p:timing>
+    <p:tnLst>
+      <p:par>
+        <p:cTn xmlns:p14="http://schemas.microsoft.com/office/powerpoint/2010/main" id="1" dur="indefinite" restart="never" nodeType="tmRoot"/>
+      </p:par>
+    </p:tnLst>
+  </p:timing>
+</p:sld>
+</file>
+
+<file path=ppt/slides/slide4.xml><?xml version="1.0" encoding="utf-8"?>
+<p:sld xmlns:a="http://schemas.openxmlformats.org/drawingml/2006/main" xmlns:r="http://schemas.openxmlformats.org/officeDocument/2006/relationships" xmlns:p="http://schemas.openxmlformats.org/presentationml/2006/main">
+  <p:cSld>
+    <p:spTree>
+      <p:nvGrpSpPr>
+        <p:cNvPr id="1" name=""/>
+        <p:cNvGrpSpPr/>
+        <p:nvPr/>
+      </p:nvGrpSpPr>
+      <p:grpSpPr>
+        <a:xfrm>
+          <a:off x="0" y="0"/>
+          <a:ext cx="0" cy="0"/>
+          <a:chOff x="0" y="0"/>
+          <a:chExt cx="0" cy="0"/>
+        </a:xfrm>
+      </p:grpSpPr>
+      <p:sp>
+        <p:nvSpPr>
           <p:cNvPr id="4" name="TextBox 3"/>
           <p:cNvSpPr txBox="1"/>
           <p:nvPr/>
@@ -11607,7 +11466,7 @@
 </p:sld>
 </file>
 
-<file path=ppt/slides/slide4.xml><?xml version="1.0" encoding="utf-8"?>
+<file path=ppt/slides/slide5.xml><?xml version="1.0" encoding="utf-8"?>
 <p:sld xmlns:a="http://schemas.openxmlformats.org/drawingml/2006/main" xmlns:r="http://schemas.openxmlformats.org/officeDocument/2006/relationships" xmlns:p="http://schemas.openxmlformats.org/presentationml/2006/main">
   <p:cSld>
     <p:spTree>
@@ -11968,73 +11827,6 @@
 </p:sld>
 </file>
 
-<file path=ppt/slides/slide5.xml><?xml version="1.0" encoding="utf-8"?>
-<p:sld xmlns:a="http://schemas.openxmlformats.org/drawingml/2006/main" xmlns:r="http://schemas.openxmlformats.org/officeDocument/2006/relationships" xmlns:p="http://schemas.openxmlformats.org/presentationml/2006/main">
-  <p:cSld>
-    <p:spTree>
-      <p:nvGrpSpPr>
-        <p:cNvPr id="1" name=""/>
-        <p:cNvGrpSpPr/>
-        <p:nvPr/>
-      </p:nvGrpSpPr>
-      <p:grpSpPr>
-        <a:xfrm>
-          <a:off x="0" y="0"/>
-          <a:ext cx="0" cy="0"/>
-          <a:chOff x="0" y="0"/>
-          <a:chExt cx="0" cy="0"/>
-        </a:xfrm>
-      </p:grpSpPr>
-      <p:pic>
-        <p:nvPicPr>
-          <p:cNvPr id="2" name="Picture 1" descr="New Home.jpg"/>
-          <p:cNvPicPr>
-            <a:picLocks noChangeAspect="1"/>
-          </p:cNvPicPr>
-          <p:nvPr/>
-        </p:nvPicPr>
-        <p:blipFill>
-          <a:blip r:embed="rId2">
-            <a:extLst>
-              <a:ext uri="{28A0092B-C50C-407E-A947-70E740481C1C}">
-                <a14:useLocalDpi xmlns:a14="http://schemas.microsoft.com/office/drawing/2010/main" val="0"/>
-              </a:ext>
-            </a:extLst>
-          </a:blip>
-          <a:stretch>
-            <a:fillRect/>
-          </a:stretch>
-        </p:blipFill>
-        <p:spPr>
-          <a:xfrm>
-            <a:off x="644770" y="361462"/>
-            <a:ext cx="8011519" cy="4181231"/>
-          </a:xfrm>
-          <a:prstGeom prst="rect">
-            <a:avLst/>
-          </a:prstGeom>
-        </p:spPr>
-      </p:pic>
-    </p:spTree>
-    <p:extLst>
-      <p:ext uri="{BB962C8B-B14F-4D97-AF65-F5344CB8AC3E}">
-        <p14:creationId xmlns:p14="http://schemas.microsoft.com/office/powerpoint/2010/main" val="2866521820"/>
-      </p:ext>
-    </p:extLst>
-  </p:cSld>
-  <p:clrMapOvr>
-    <a:masterClrMapping/>
-  </p:clrMapOvr>
-  <p:timing>
-    <p:tnLst>
-      <p:par>
-        <p:cTn xmlns:p14="http://schemas.microsoft.com/office/powerpoint/2010/main" id="1" dur="indefinite" restart="never" nodeType="tmRoot"/>
-      </p:par>
-    </p:tnLst>
-  </p:timing>
-</p:sld>
-</file>
-
 <file path=ppt/slides/slide6.xml><?xml version="1.0" encoding="utf-8"?>
 <p:sld xmlns:a="http://schemas.openxmlformats.org/drawingml/2006/main" xmlns:r="http://schemas.openxmlformats.org/officeDocument/2006/relationships" xmlns:p="http://schemas.openxmlformats.org/presentationml/2006/main">
   <p:cSld>
@@ -12052,40 +11844,125 @@
           <a:chExt cx="0" cy="0"/>
         </a:xfrm>
       </p:grpSpPr>
-      <p:pic>
-        <p:nvPicPr>
-          <p:cNvPr id="3" name="Picture 2" descr="Sign_in.jpg"/>
-          <p:cNvPicPr>
-            <a:picLocks noChangeAspect="1"/>
-          </p:cNvPicPr>
+      <p:sp>
+        <p:nvSpPr>
+          <p:cNvPr id="4" name="TextBox 3"/>
+          <p:cNvSpPr txBox="1"/>
           <p:nvPr/>
-        </p:nvPicPr>
-        <p:blipFill>
-          <a:blip r:embed="rId2" cstate="email">
-            <a:extLst>
-              <a:ext uri="{28A0092B-C50C-407E-A947-70E740481C1C}">
-                <a14:useLocalDpi xmlns:a14="http://schemas.microsoft.com/office/drawing/2010/main" val="0"/>
-              </a:ext>
-            </a:extLst>
-          </a:blip>
-          <a:stretch>
-            <a:fillRect/>
-          </a:stretch>
-        </p:blipFill>
+        </p:nvSpPr>
         <p:spPr>
           <a:xfrm>
-            <a:off x="932301" y="724794"/>
-            <a:ext cx="7498959" cy="2976808"/>
+            <a:off x="620890" y="423333"/>
+            <a:ext cx="5065889" cy="707886"/>
           </a:xfrm>
           <a:prstGeom prst="rect">
             <a:avLst/>
           </a:prstGeom>
+          <a:noFill/>
         </p:spPr>
-      </p:pic>
+        <p:txBody>
+          <a:bodyPr wrap="square" lIns="91438" tIns="45719" rIns="91438" bIns="45719" rtlCol="0">
+            <a:spAutoFit/>
+          </a:bodyPr>
+          <a:lstStyle/>
+          <a:p>
+            <a:r>
+              <a:rPr lang="en-US" sz="4000" dirty="0" smtClean="0">
+                <a:latin typeface="Calibri Light"/>
+                <a:cs typeface="Calibri Light"/>
+              </a:rPr>
+              <a:t>Scheduler</a:t>
+            </a:r>
+            <a:endParaRPr lang="en-US" sz="4000" dirty="0">
+              <a:latin typeface="Calibri Light"/>
+              <a:cs typeface="Calibri Light"/>
+            </a:endParaRPr>
+          </a:p>
+        </p:txBody>
+      </p:sp>
+      <p:sp>
+        <p:nvSpPr>
+          <p:cNvPr id="5" name="TextBox 4"/>
+          <p:cNvSpPr txBox="1"/>
+          <p:nvPr/>
+        </p:nvSpPr>
+        <p:spPr>
+          <a:xfrm>
+            <a:off x="903112" y="1248834"/>
+            <a:ext cx="7874001" cy="1938990"/>
+          </a:xfrm>
+          <a:prstGeom prst="rect">
+            <a:avLst/>
+          </a:prstGeom>
+          <a:noFill/>
+        </p:spPr>
+        <p:txBody>
+          <a:bodyPr wrap="square" lIns="91438" tIns="45719" rIns="91438" bIns="45719" rtlCol="0">
+            <a:spAutoFit/>
+          </a:bodyPr>
+          <a:lstStyle/>
+          <a:p>
+            <a:r>
+              <a:rPr lang="en-US" sz="3000" dirty="0" smtClean="0">
+                <a:latin typeface="Calibri Light"/>
+                <a:cs typeface="Calibri Light"/>
+              </a:rPr>
+              <a:t>Initialized code to be executed without user sign-in. Then go through database to check whether any classes have changed class, and also check whether any users are checking those classes.</a:t>
+            </a:r>
+            <a:endParaRPr lang="en-US" sz="3000" dirty="0">
+              <a:latin typeface="Calibri Light"/>
+              <a:cs typeface="Calibri Light"/>
+            </a:endParaRPr>
+          </a:p>
+        </p:txBody>
+      </p:sp>
+      <p:sp>
+        <p:nvSpPr>
+          <p:cNvPr id="7" name="TextBox 6"/>
+          <p:cNvSpPr txBox="1"/>
+          <p:nvPr/>
+        </p:nvSpPr>
+        <p:spPr>
+          <a:xfrm>
+            <a:off x="903112" y="3420459"/>
+            <a:ext cx="7874001" cy="1015661"/>
+          </a:xfrm>
+          <a:prstGeom prst="rect">
+            <a:avLst/>
+          </a:prstGeom>
+          <a:noFill/>
+        </p:spPr>
+        <p:txBody>
+          <a:bodyPr wrap="square" lIns="91438" tIns="45719" rIns="91438" bIns="45719" rtlCol="0">
+            <a:spAutoFit/>
+          </a:bodyPr>
+          <a:lstStyle/>
+          <a:p>
+            <a:r>
+              <a:rPr lang="en-US" sz="3000" dirty="0">
+                <a:latin typeface="Calibri Light"/>
+                <a:cs typeface="Calibri Light"/>
+              </a:rPr>
+              <a:t>Use of </a:t>
+            </a:r>
+            <a:r>
+              <a:rPr lang="en-US" sz="3000" dirty="0" smtClean="0">
+                <a:latin typeface="Calibri Light"/>
+                <a:cs typeface="Calibri Light"/>
+              </a:rPr>
+              <a:t>Gmail to send out notification for users with those classes; based on time set by user</a:t>
+            </a:r>
+            <a:endParaRPr lang="en-US" sz="3000" dirty="0">
+              <a:latin typeface="Calibri Light"/>
+              <a:cs typeface="Calibri Light"/>
+            </a:endParaRPr>
+          </a:p>
+        </p:txBody>
+      </p:sp>
     </p:spTree>
     <p:extLst>
       <p:ext uri="{BB962C8B-B14F-4D97-AF65-F5344CB8AC3E}">
-        <p14:creationId xmlns:p14="http://schemas.microsoft.com/office/powerpoint/2010/main" val="453530226"/>
+        <p14:creationId xmlns:p14="http://schemas.microsoft.com/office/powerpoint/2010/main" val="1814176957"/>
       </p:ext>
     </p:extLst>
   </p:cSld>
@@ -12119,40 +11996,126 @@
           <a:chExt cx="0" cy="0"/>
         </a:xfrm>
       </p:grpSpPr>
-      <p:pic>
-        <p:nvPicPr>
-          <p:cNvPr id="3" name="Picture 2" descr="Create_User_with_content.jpg"/>
-          <p:cNvPicPr>
-            <a:picLocks noChangeAspect="1"/>
-          </p:cNvPicPr>
+      <p:sp>
+        <p:nvSpPr>
+          <p:cNvPr id="4" name="TextBox 3"/>
+          <p:cNvSpPr txBox="1"/>
           <p:nvPr/>
-        </p:nvPicPr>
-        <p:blipFill>
-          <a:blip r:embed="rId2" cstate="email">
-            <a:extLst>
-              <a:ext uri="{28A0092B-C50C-407E-A947-70E740481C1C}">
-                <a14:useLocalDpi xmlns:a14="http://schemas.microsoft.com/office/drawing/2010/main" val="0"/>
-              </a:ext>
-            </a:extLst>
-          </a:blip>
-          <a:stretch>
-            <a:fillRect/>
-          </a:stretch>
-        </p:blipFill>
+        </p:nvSpPr>
         <p:spPr>
           <a:xfrm>
-            <a:off x="0" y="837549"/>
-            <a:ext cx="9144000" cy="3224387"/>
+            <a:off x="620890" y="423333"/>
+            <a:ext cx="7126110" cy="707884"/>
           </a:xfrm>
           <a:prstGeom prst="rect">
             <a:avLst/>
           </a:prstGeom>
+          <a:noFill/>
         </p:spPr>
-      </p:pic>
+        <p:txBody>
+          <a:bodyPr wrap="square" lIns="91438" tIns="45719" rIns="91438" bIns="45719" rtlCol="0">
+            <a:spAutoFit/>
+          </a:bodyPr>
+          <a:lstStyle/>
+          <a:p>
+            <a:r>
+              <a:rPr lang="en-US" sz="4000" smtClean="0">
+                <a:latin typeface="Calibri Light"/>
+                <a:cs typeface="Calibri Light"/>
+              </a:rPr>
+              <a:t>Expected </a:t>
+            </a:r>
+            <a:r>
+              <a:rPr lang="en-US" sz="4000" dirty="0" smtClean="0">
+                <a:latin typeface="Calibri Light"/>
+                <a:cs typeface="Calibri Light"/>
+              </a:rPr>
+              <a:t>Features</a:t>
+            </a:r>
+            <a:endParaRPr lang="en-US" sz="4000" dirty="0">
+              <a:latin typeface="Calibri Light"/>
+              <a:cs typeface="Calibri Light"/>
+            </a:endParaRPr>
+          </a:p>
+        </p:txBody>
+      </p:sp>
+      <p:sp>
+        <p:nvSpPr>
+          <p:cNvPr id="5" name="TextBox 4"/>
+          <p:cNvSpPr txBox="1"/>
+          <p:nvPr/>
+        </p:nvSpPr>
+        <p:spPr>
+          <a:xfrm>
+            <a:off x="903112" y="1248834"/>
+            <a:ext cx="7874001" cy="2400655"/>
+          </a:xfrm>
+          <a:prstGeom prst="rect">
+            <a:avLst/>
+          </a:prstGeom>
+          <a:noFill/>
+        </p:spPr>
+        <p:txBody>
+          <a:bodyPr wrap="square" lIns="91438" tIns="45719" rIns="91438" bIns="45719" rtlCol="0">
+            <a:spAutoFit/>
+          </a:bodyPr>
+          <a:lstStyle/>
+          <a:p>
+            <a:pPr marL="457200" indent="-457200">
+              <a:buFont typeface="Arial"/>
+              <a:buChar char="•"/>
+            </a:pPr>
+            <a:r>
+              <a:rPr lang="en-US" sz="3000" dirty="0" smtClean="0">
+                <a:latin typeface="Calibri Light"/>
+                <a:cs typeface="Calibri Light"/>
+              </a:rPr>
+              <a:t>User creates an account and able to add courses</a:t>
+            </a:r>
+          </a:p>
+          <a:p>
+            <a:pPr marL="457200" indent="-457200">
+              <a:buFont typeface="Arial"/>
+              <a:buChar char="•"/>
+            </a:pPr>
+            <a:r>
+              <a:rPr lang="en-US" sz="3000" dirty="0" smtClean="0">
+                <a:latin typeface="Calibri Light"/>
+                <a:cs typeface="Calibri Light"/>
+              </a:rPr>
+              <a:t>Search feature to find out if ther</a:t>
+            </a:r>
+            <a:r>
+              <a:rPr lang="en-US" sz="3000" dirty="0" smtClean="0">
+                <a:latin typeface="Calibri Light"/>
+                <a:cs typeface="Calibri Light"/>
+              </a:rPr>
+              <a:t>e is a particular course</a:t>
+            </a:r>
+          </a:p>
+          <a:p>
+            <a:pPr marL="457200" indent="-457200">
+              <a:buFont typeface="Arial"/>
+              <a:buChar char="•"/>
+            </a:pPr>
+            <a:r>
+              <a:rPr lang="en-US" sz="3000" dirty="0" smtClean="0">
+                <a:latin typeface="Calibri Light"/>
+                <a:cs typeface="Calibri Light"/>
+              </a:rPr>
+              <a:t>Email message notifications</a:t>
+            </a:r>
+            <a:endParaRPr lang="en-US" sz="3000" dirty="0">
+              <a:latin typeface="Calibri Light"/>
+              <a:cs typeface="Calibri Light"/>
+            </a:endParaRPr>
+          </a:p>
+        </p:txBody>
+      </p:sp>
     </p:spTree>
     <p:extLst>
       <p:ext uri="{BB962C8B-B14F-4D97-AF65-F5344CB8AC3E}">
-        <p14:creationId xmlns:p14="http://schemas.microsoft.com/office/powerpoint/2010/main" val="2188518232"/>
+        <p14:creationId xmlns:p14="http://schemas.microsoft.com/office/powerpoint/2010/main" val="3093596181"/>
       </p:ext>
     </p:extLst>
   </p:cSld>
@@ -12186,107 +12149,132 @@
           <a:chExt cx="0" cy="0"/>
         </a:xfrm>
       </p:grpSpPr>
-      <p:pic>
-        <p:nvPicPr>
-          <p:cNvPr id="3" name="Picture 2" descr="Sign_in_with_content.jpg"/>
-          <p:cNvPicPr>
-            <a:picLocks noChangeAspect="1"/>
-          </p:cNvPicPr>
+      <p:sp>
+        <p:nvSpPr>
+          <p:cNvPr id="4" name="TextBox 3"/>
+          <p:cNvSpPr txBox="1"/>
           <p:nvPr/>
-        </p:nvPicPr>
-        <p:blipFill>
-          <a:blip r:embed="rId2" cstate="email">
-            <a:extLst>
-              <a:ext uri="{28A0092B-C50C-407E-A947-70E740481C1C}">
-                <a14:useLocalDpi xmlns:a14="http://schemas.microsoft.com/office/drawing/2010/main" val="0"/>
-              </a:ext>
-            </a:extLst>
-          </a:blip>
-          <a:stretch>
-            <a:fillRect/>
-          </a:stretch>
-        </p:blipFill>
+        </p:nvSpPr>
         <p:spPr>
           <a:xfrm>
-            <a:off x="270231" y="715971"/>
-            <a:ext cx="8477527" cy="3390724"/>
+            <a:off x="620890" y="423333"/>
+            <a:ext cx="7126110" cy="707884"/>
           </a:xfrm>
           <a:prstGeom prst="rect">
             <a:avLst/>
           </a:prstGeom>
+          <a:noFill/>
         </p:spPr>
-      </p:pic>
-    </p:spTree>
-    <p:extLst>
-      <p:ext uri="{BB962C8B-B14F-4D97-AF65-F5344CB8AC3E}">
-        <p14:creationId xmlns:p14="http://schemas.microsoft.com/office/powerpoint/2010/main" val="2567115370"/>
-      </p:ext>
-    </p:extLst>
-  </p:cSld>
-  <p:clrMapOvr>
-    <a:masterClrMapping/>
-  </p:clrMapOvr>
-  <p:timing>
-    <p:tnLst>
-      <p:par>
-        <p:cTn xmlns:p14="http://schemas.microsoft.com/office/powerpoint/2010/main" id="1" dur="indefinite" restart="never" nodeType="tmRoot"/>
-      </p:par>
-    </p:tnLst>
-  </p:timing>
-</p:sld>
-</file>
-
-<file path=ppt/slides/slide9.xml><?xml version="1.0" encoding="utf-8"?>
-<p:sld xmlns:a="http://schemas.openxmlformats.org/drawingml/2006/main" xmlns:r="http://schemas.openxmlformats.org/officeDocument/2006/relationships" xmlns:p="http://schemas.openxmlformats.org/presentationml/2006/main">
-  <p:cSld>
-    <p:spTree>
-      <p:nvGrpSpPr>
-        <p:cNvPr id="1" name=""/>
-        <p:cNvGrpSpPr/>
-        <p:nvPr/>
-      </p:nvGrpSpPr>
-      <p:grpSpPr>
-        <a:xfrm>
-          <a:off x="0" y="0"/>
-          <a:ext cx="0" cy="0"/>
-          <a:chOff x="0" y="0"/>
-          <a:chExt cx="0" cy="0"/>
-        </a:xfrm>
-      </p:grpSpPr>
-      <p:pic>
-        <p:nvPicPr>
-          <p:cNvPr id="2" name="Picture 1" descr="Profile.jpg"/>
-          <p:cNvPicPr>
-            <a:picLocks noChangeAspect="1"/>
-          </p:cNvPicPr>
+        <p:txBody>
+          <a:bodyPr wrap="square" lIns="91438" tIns="45719" rIns="91438" bIns="45719" rtlCol="0">
+            <a:spAutoFit/>
+          </a:bodyPr>
+          <a:lstStyle/>
+          <a:p>
+            <a:r>
+              <a:rPr lang="en-US" sz="4000" dirty="0" smtClean="0">
+                <a:latin typeface="Calibri Light"/>
+                <a:cs typeface="Calibri Light"/>
+              </a:rPr>
+              <a:t>Final Product</a:t>
+            </a:r>
+            <a:endParaRPr lang="en-US" sz="4000" dirty="0">
+              <a:latin typeface="Calibri Light"/>
+              <a:cs typeface="Calibri Light"/>
+            </a:endParaRPr>
+          </a:p>
+        </p:txBody>
+      </p:sp>
+      <p:sp>
+        <p:nvSpPr>
+          <p:cNvPr id="5" name="TextBox 4"/>
+          <p:cNvSpPr txBox="1"/>
           <p:nvPr/>
-        </p:nvPicPr>
-        <p:blipFill>
-          <a:blip r:embed="rId2">
-            <a:extLst>
-              <a:ext uri="{28A0092B-C50C-407E-A947-70E740481C1C}">
-                <a14:useLocalDpi xmlns:a14="http://schemas.microsoft.com/office/drawing/2010/main" val="0"/>
-              </a:ext>
-            </a:extLst>
-          </a:blip>
-          <a:stretch>
-            <a:fillRect/>
-          </a:stretch>
-        </p:blipFill>
+        </p:nvSpPr>
         <p:spPr>
           <a:xfrm>
-            <a:off x="527537" y="732692"/>
-            <a:ext cx="8274539" cy="3292231"/>
+            <a:off x="903112" y="1248834"/>
+            <a:ext cx="7874001" cy="3323985"/>
           </a:xfrm>
           <a:prstGeom prst="rect">
             <a:avLst/>
           </a:prstGeom>
+          <a:noFill/>
         </p:spPr>
-      </p:pic>
+        <p:txBody>
+          <a:bodyPr wrap="square" lIns="91438" tIns="45719" rIns="91438" bIns="45719" rtlCol="0">
+            <a:spAutoFit/>
+          </a:bodyPr>
+          <a:lstStyle/>
+          <a:p>
+            <a:pPr marL="457200" indent="-457200">
+              <a:buFont typeface="Arial"/>
+              <a:buChar char="•"/>
+            </a:pPr>
+            <a:r>
+              <a:rPr lang="en-US" sz="3000" dirty="0" smtClean="0">
+                <a:latin typeface="Calibri Light"/>
+                <a:cs typeface="Calibri Light"/>
+              </a:rPr>
+              <a:t>User creates an account and able to add courses</a:t>
+            </a:r>
+          </a:p>
+          <a:p>
+            <a:pPr marL="457200" indent="-457200">
+              <a:buFont typeface="Arial"/>
+              <a:buChar char="•"/>
+            </a:pPr>
+            <a:r>
+              <a:rPr lang="en-US" sz="3000" dirty="0" smtClean="0">
+                <a:latin typeface="Calibri Light"/>
+                <a:cs typeface="Calibri Light"/>
+              </a:rPr>
+              <a:t>Search feature to find out if ther</a:t>
+            </a:r>
+            <a:r>
+              <a:rPr lang="en-US" sz="3000" dirty="0" smtClean="0">
+                <a:latin typeface="Calibri Light"/>
+                <a:cs typeface="Calibri Light"/>
+              </a:rPr>
+              <a:t>e is a particular course</a:t>
+            </a:r>
+          </a:p>
+          <a:p>
+            <a:pPr marL="457200" indent="-457200">
+              <a:buFont typeface="Arial"/>
+              <a:buChar char="•"/>
+            </a:pPr>
+            <a:r>
+              <a:rPr lang="en-US" sz="3000" dirty="0" smtClean="0">
+                <a:latin typeface="Calibri Light"/>
+                <a:cs typeface="Calibri Light"/>
+              </a:rPr>
+              <a:t>Users able to view courses without being redirected to separate page</a:t>
+            </a:r>
+          </a:p>
+          <a:p>
+            <a:pPr marL="457200" indent="-457200">
+              <a:buFont typeface="Arial"/>
+              <a:buChar char="•"/>
+            </a:pPr>
+            <a:r>
+              <a:rPr lang="en-US" sz="3000" dirty="0" smtClean="0">
+                <a:latin typeface="Calibri Light"/>
+                <a:cs typeface="Calibri Light"/>
+              </a:rPr>
+              <a:t>Email message notifications</a:t>
+            </a:r>
+            <a:endParaRPr lang="en-US" sz="3000" dirty="0">
+              <a:latin typeface="Calibri Light"/>
+              <a:cs typeface="Calibri Light"/>
+            </a:endParaRPr>
+          </a:p>
+        </p:txBody>
+      </p:sp>
     </p:spTree>
     <p:extLst>
       <p:ext uri="{BB962C8B-B14F-4D97-AF65-F5344CB8AC3E}">
-        <p14:creationId xmlns:p14="http://schemas.microsoft.com/office/powerpoint/2010/main" val="2508994320"/>
+        <p14:creationId xmlns:p14="http://schemas.microsoft.com/office/powerpoint/2010/main" val="985134207"/>
       </p:ext>
     </p:extLst>
   </p:cSld>

</xml_diff>

<commit_message>
Minor change to the final presentation slides; admittedly, all of the tables are closely intertwined in everything and it is difficult to clearly map out the relationships between the tables.
</commit_message>
<xml_diff>
--- a/Course_Avail_Final.pptx
+++ b/Course_Avail_Final.pptx
@@ -118,7 +118,7 @@
   </p:defaultTextStyle>
   <p:extLst>
     <p:ext uri="{EFAFB233-063F-42B5-8137-9DF3F51BA10A}">
-      <p15:sldGuideLst xmlns:p15="http://schemas.microsoft.com/office/powerpoint/2012/main" xmlns="">
+      <p15:sldGuideLst xmlns:p15="http://schemas.microsoft.com/office/powerpoint/2012/main">
         <p15:guide id="1" orient="horz" pos="1620">
           <p15:clr>
             <a:srgbClr val="A4A3A4"/>
@@ -218,7 +218,7 @@
             <a:fld id="{A37281A0-962A-47F4-9481-A75AEA6E69B5}" type="datetimeFigureOut">
               <a:rPr lang="en-US" smtClean="0"/>
               <a:pPr/>
-              <a:t>12/9/13</a:t>
+              <a:t>12/10/2013</a:t>
             </a:fld>
             <a:endParaRPr lang="en-US"/>
           </a:p>
@@ -864,7 +864,7 @@
             <a:fld id="{B01F9CA3-105E-4857-9057-6DB6197DA786}" type="datetimeFigureOut">
               <a:rPr lang="en-US" smtClean="0"/>
               <a:pPr/>
-              <a:t>12/9/13</a:t>
+              <a:t>12/10/2013</a:t>
             </a:fld>
             <a:endParaRPr lang="en-US"/>
           </a:p>
@@ -1058,7 +1058,7 @@
             <a:fld id="{B01F9CA3-105E-4857-9057-6DB6197DA786}" type="datetimeFigureOut">
               <a:rPr lang="en-US" smtClean="0"/>
               <a:pPr/>
-              <a:t>12/9/13</a:t>
+              <a:t>12/10/2013</a:t>
             </a:fld>
             <a:endParaRPr lang="en-US"/>
           </a:p>
@@ -1329,7 +1329,7 @@
             <a:fld id="{B01F9CA3-105E-4857-9057-6DB6197DA786}" type="datetimeFigureOut">
               <a:rPr lang="en-US" smtClean="0"/>
               <a:pPr/>
-              <a:t>12/9/13</a:t>
+              <a:t>12/10/2013</a:t>
             </a:fld>
             <a:endParaRPr lang="en-US"/>
           </a:p>
@@ -1510,7 +1510,7 @@
             <a:fld id="{B01F9CA3-105E-4857-9057-6DB6197DA786}" type="datetimeFigureOut">
               <a:rPr lang="en-US" smtClean="0"/>
               <a:pPr/>
-              <a:t>12/9/13</a:t>
+              <a:t>12/10/2013</a:t>
             </a:fld>
             <a:endParaRPr lang="en-US"/>
           </a:p>
@@ -1706,7 +1706,7 @@
                 <a:latin typeface="Calibri"/>
               </a:rPr>
               <a:pPr/>
-              <a:t>12/9/13</a:t>
+              <a:t>12/10/2013</a:t>
             </a:fld>
             <a:endParaRPr lang="en-US">
               <a:solidFill>
@@ -1913,7 +1913,7 @@
                 <a:latin typeface="Calibri"/>
               </a:rPr>
               <a:pPr/>
-              <a:t>12/9/13</a:t>
+              <a:t>12/10/2013</a:t>
             </a:fld>
             <a:endParaRPr lang="en-US">
               <a:solidFill>
@@ -2196,7 +2196,7 @@
                 <a:latin typeface="Calibri"/>
               </a:rPr>
               <a:pPr/>
-              <a:t>12/9/13</a:t>
+              <a:t>12/10/2013</a:t>
             </a:fld>
             <a:endParaRPr lang="en-US">
               <a:solidFill>
@@ -2465,7 +2465,7 @@
                 <a:latin typeface="Calibri"/>
               </a:rPr>
               <a:pPr/>
-              <a:t>12/9/13</a:t>
+              <a:t>12/10/2013</a:t>
             </a:fld>
             <a:endParaRPr lang="en-US">
               <a:solidFill>
@@ -2869,7 +2869,7 @@
                 <a:latin typeface="Calibri"/>
               </a:rPr>
               <a:pPr/>
-              <a:t>12/9/13</a:t>
+              <a:t>12/10/2013</a:t>
             </a:fld>
             <a:endParaRPr lang="en-US">
               <a:solidFill>
@@ -3024,7 +3024,7 @@
                 <a:latin typeface="Calibri"/>
               </a:rPr>
               <a:pPr/>
-              <a:t>12/9/13</a:t>
+              <a:t>12/10/2013</a:t>
             </a:fld>
             <a:endParaRPr lang="en-US">
               <a:solidFill>
@@ -3156,7 +3156,7 @@
                 <a:latin typeface="Calibri"/>
               </a:rPr>
               <a:pPr/>
-              <a:t>12/9/13</a:t>
+              <a:t>12/10/2013</a:t>
             </a:fld>
             <a:endParaRPr lang="en-US">
               <a:solidFill>
@@ -3360,7 +3360,7 @@
             <a:fld id="{B01F9CA3-105E-4857-9057-6DB6197DA786}" type="datetimeFigureOut">
               <a:rPr lang="en-US" smtClean="0"/>
               <a:pPr/>
-              <a:t>12/9/13</a:t>
+              <a:t>12/10/2013</a:t>
             </a:fld>
             <a:endParaRPr lang="en-US"/>
           </a:p>
@@ -3641,7 +3641,7 @@
                 <a:latin typeface="Calibri"/>
               </a:rPr>
               <a:pPr/>
-              <a:t>12/9/13</a:t>
+              <a:t>12/10/2013</a:t>
             </a:fld>
             <a:endParaRPr lang="en-US">
               <a:solidFill>
@@ -3931,7 +3931,7 @@
                 <a:latin typeface="Calibri"/>
               </a:rPr>
               <a:pPr/>
-              <a:t>12/9/13</a:t>
+              <a:t>12/10/2013</a:t>
             </a:fld>
             <a:endParaRPr lang="en-US">
               <a:solidFill>
@@ -4138,7 +4138,7 @@
                 <a:latin typeface="Calibri"/>
               </a:rPr>
               <a:pPr/>
-              <a:t>12/9/13</a:t>
+              <a:t>12/10/2013</a:t>
             </a:fld>
             <a:endParaRPr lang="en-US">
               <a:solidFill>
@@ -4355,7 +4355,7 @@
                 <a:latin typeface="Calibri"/>
               </a:rPr>
               <a:pPr/>
-              <a:t>12/9/13</a:t>
+              <a:t>12/10/2013</a:t>
             </a:fld>
             <a:endParaRPr lang="en-US">
               <a:solidFill>
@@ -4584,7 +4584,7 @@
                 <a:latin typeface="Calibri"/>
               </a:rPr>
               <a:pPr/>
-              <a:t>12/9/13</a:t>
+              <a:t>12/10/2013</a:t>
             </a:fld>
             <a:endParaRPr lang="en-US">
               <a:solidFill>
@@ -4791,7 +4791,7 @@
                 <a:latin typeface="Calibri"/>
               </a:rPr>
               <a:pPr/>
-              <a:t>12/9/13</a:t>
+              <a:t>12/10/2013</a:t>
             </a:fld>
             <a:endParaRPr lang="en-US">
               <a:solidFill>
@@ -5074,7 +5074,7 @@
                 <a:latin typeface="Calibri"/>
               </a:rPr>
               <a:pPr/>
-              <a:t>12/9/13</a:t>
+              <a:t>12/10/2013</a:t>
             </a:fld>
             <a:endParaRPr lang="en-US">
               <a:solidFill>
@@ -5343,7 +5343,7 @@
                 <a:latin typeface="Calibri"/>
               </a:rPr>
               <a:pPr/>
-              <a:t>12/9/13</a:t>
+              <a:t>12/10/2013</a:t>
             </a:fld>
             <a:endParaRPr lang="en-US">
               <a:solidFill>
@@ -5747,7 +5747,7 @@
                 <a:latin typeface="Calibri"/>
               </a:rPr>
               <a:pPr/>
-              <a:t>12/9/13</a:t>
+              <a:t>12/10/2013</a:t>
             </a:fld>
             <a:endParaRPr lang="en-US">
               <a:solidFill>
@@ -5902,7 +5902,7 @@
                 <a:latin typeface="Calibri"/>
               </a:rPr>
               <a:pPr/>
-              <a:t>12/9/13</a:t>
+              <a:t>12/10/2013</a:t>
             </a:fld>
             <a:endParaRPr lang="en-US">
               <a:solidFill>
@@ -6179,7 +6179,7 @@
             <a:fld id="{B01F9CA3-105E-4857-9057-6DB6197DA786}" type="datetimeFigureOut">
               <a:rPr lang="en-US" smtClean="0"/>
               <a:pPr/>
-              <a:t>12/9/13</a:t>
+              <a:t>12/10/2013</a:t>
             </a:fld>
             <a:endParaRPr lang="en-US"/>
           </a:p>
@@ -6355,7 +6355,7 @@
                 <a:latin typeface="Calibri"/>
               </a:rPr>
               <a:pPr/>
-              <a:t>12/9/13</a:t>
+              <a:t>12/10/2013</a:t>
             </a:fld>
             <a:endParaRPr lang="en-US">
               <a:solidFill>
@@ -6669,7 +6669,7 @@
                 <a:latin typeface="Calibri"/>
               </a:rPr>
               <a:pPr/>
-              <a:t>12/9/13</a:t>
+              <a:t>12/10/2013</a:t>
             </a:fld>
             <a:endParaRPr lang="en-US">
               <a:solidFill>
@@ -6959,7 +6959,7 @@
                 <a:latin typeface="Calibri"/>
               </a:rPr>
               <a:pPr/>
-              <a:t>12/9/13</a:t>
+              <a:t>12/10/2013</a:t>
             </a:fld>
             <a:endParaRPr lang="en-US">
               <a:solidFill>
@@ -7166,7 +7166,7 @@
                 <a:latin typeface="Calibri"/>
               </a:rPr>
               <a:pPr/>
-              <a:t>12/9/13</a:t>
+              <a:t>12/10/2013</a:t>
             </a:fld>
             <a:endParaRPr lang="en-US">
               <a:solidFill>
@@ -7383,7 +7383,7 @@
                 <a:latin typeface="Calibri"/>
               </a:rPr>
               <a:pPr/>
-              <a:t>12/9/13</a:t>
+              <a:t>12/10/2013</a:t>
             </a:fld>
             <a:endParaRPr lang="en-US">
               <a:solidFill>
@@ -7664,7 +7664,7 @@
             <a:fld id="{B01F9CA3-105E-4857-9057-6DB6197DA786}" type="datetimeFigureOut">
               <a:rPr lang="en-US" smtClean="0"/>
               <a:pPr/>
-              <a:t>12/9/13</a:t>
+              <a:t>12/10/2013</a:t>
             </a:fld>
             <a:endParaRPr lang="en-US"/>
           </a:p>
@@ -7964,7 +7964,7 @@
             <a:fld id="{B01F9CA3-105E-4857-9057-6DB6197DA786}" type="datetimeFigureOut">
               <a:rPr lang="en-US" smtClean="0"/>
               <a:pPr/>
-              <a:t>12/9/13</a:t>
+              <a:t>12/10/2013</a:t>
             </a:fld>
             <a:endParaRPr lang="en-US"/>
           </a:p>
@@ -8422,7 +8422,7 @@
             <a:fld id="{B01F9CA3-105E-4857-9057-6DB6197DA786}" type="datetimeFigureOut">
               <a:rPr lang="en-US" smtClean="0"/>
               <a:pPr/>
-              <a:t>12/9/13</a:t>
+              <a:t>12/10/2013</a:t>
             </a:fld>
             <a:endParaRPr lang="en-US"/>
           </a:p>
@@ -8537,7 +8537,7 @@
             <a:fld id="{B01F9CA3-105E-4857-9057-6DB6197DA786}" type="datetimeFigureOut">
               <a:rPr lang="en-US" smtClean="0"/>
               <a:pPr/>
-              <a:t>12/9/13</a:t>
+              <a:t>12/10/2013</a:t>
             </a:fld>
             <a:endParaRPr lang="en-US"/>
           </a:p>
@@ -8629,7 +8629,7 @@
             <a:fld id="{B01F9CA3-105E-4857-9057-6DB6197DA786}" type="datetimeFigureOut">
               <a:rPr lang="en-US" smtClean="0"/>
               <a:pPr/>
-              <a:t>12/9/13</a:t>
+              <a:t>12/10/2013</a:t>
             </a:fld>
             <a:endParaRPr lang="en-US"/>
           </a:p>
@@ -8913,7 +8913,7 @@
             <a:fld id="{B01F9CA3-105E-4857-9057-6DB6197DA786}" type="datetimeFigureOut">
               <a:rPr lang="en-US" smtClean="0"/>
               <a:pPr/>
-              <a:t>12/9/13</a:t>
+              <a:t>12/10/2013</a:t>
             </a:fld>
             <a:endParaRPr lang="en-US"/>
           </a:p>
@@ -9126,7 +9126,7 @@
             <a:fld id="{B01F9CA3-105E-4857-9057-6DB6197DA786}" type="datetimeFigureOut">
               <a:rPr lang="en-US" smtClean="0"/>
               <a:pPr/>
-              <a:t>12/9/13</a:t>
+              <a:t>12/10/2013</a:t>
             </a:fld>
             <a:endParaRPr lang="en-US"/>
           </a:p>
@@ -9725,7 +9725,7 @@
                 <a:latin typeface="Calibri"/>
               </a:rPr>
               <a:pPr defTabSz="685783"/>
-              <a:t>12/9/13</a:t>
+              <a:t>12/10/2013</a:t>
             </a:fld>
             <a:endParaRPr lang="en-US">
               <a:solidFill>
@@ -10310,7 +10310,7 @@
                 <a:latin typeface="Calibri"/>
               </a:rPr>
               <a:pPr defTabSz="685800"/>
-              <a:t>12/9/13</a:t>
+              <a:t>12/10/2013</a:t>
             </a:fld>
             <a:endParaRPr lang="en-US">
               <a:solidFill>
@@ -11098,7 +11098,7 @@
   <p:timing>
     <p:tnLst>
       <p:par>
-        <p:cTn xmlns:p14="http://schemas.microsoft.com/office/powerpoint/2010/main" id="1" dur="indefinite" restart="never" nodeType="tmRoot"/>
+        <p:cTn id="1" dur="indefinite" restart="never" nodeType="tmRoot"/>
       </p:par>
     </p:tnLst>
   </p:timing>
@@ -11207,7 +11207,7 @@
   <p:timing>
     <p:tnLst>
       <p:par>
-        <p:cTn xmlns:p14="http://schemas.microsoft.com/office/powerpoint/2010/main" id="1" dur="indefinite" restart="never" nodeType="tmRoot"/>
+        <p:cTn id="1" dur="indefinite" restart="never" nodeType="tmRoot"/>
       </p:par>
     </p:tnLst>
   </p:timing>
@@ -11248,11 +11248,7 @@
           <a:p>
             <a:r>
               <a:rPr lang="en-US" dirty="0" smtClean="0"/>
-              <a:t>Course Availability </a:t>
-            </a:r>
-            <a:r>
-              <a:rPr lang="en-US" dirty="0" smtClean="0"/>
-              <a:t>Project – Other Goals</a:t>
+              <a:t>Course Availability Project – Other Goals</a:t>
             </a:r>
             <a:endParaRPr lang="en-US" dirty="0"/>
           </a:p>
@@ -11315,7 +11311,7 @@
   <p:timing>
     <p:tnLst>
       <p:par>
-        <p:cTn xmlns:p14="http://schemas.microsoft.com/office/powerpoint/2010/main" id="1" dur="indefinite" restart="never" nodeType="tmRoot"/>
+        <p:cTn id="1" dur="indefinite" restart="never" nodeType="tmRoot"/>
       </p:par>
     </p:tnLst>
   </p:timing>
@@ -11459,7 +11455,7 @@
   <p:timing>
     <p:tnLst>
       <p:par>
-        <p:cTn xmlns:p14="http://schemas.microsoft.com/office/powerpoint/2010/main" id="1" dur="indefinite" restart="never" nodeType="tmRoot"/>
+        <p:cTn id="1" dur="indefinite" restart="never" nodeType="tmRoot"/>
       </p:par>
     </p:tnLst>
   </p:timing>
@@ -11591,14 +11587,20 @@
           <a:p>
             <a:pPr algn="ctr" defTabSz="685766"/>
             <a:r>
-              <a:rPr lang="en-US" sz="1400" dirty="0">
+              <a:rPr lang="en-US" sz="1400" dirty="0" smtClean="0">
                 <a:solidFill>
                   <a:prstClr val="white"/>
                 </a:solidFill>
                 <a:latin typeface="Calibri"/>
               </a:rPr>
-              <a:t>User</a:t>
-            </a:r>
+              <a:t>Course</a:t>
+            </a:r>
+            <a:endParaRPr lang="en-US" sz="1400" dirty="0">
+              <a:solidFill>
+                <a:prstClr val="white"/>
+              </a:solidFill>
+              <a:latin typeface="Calibri"/>
+            </a:endParaRPr>
           </a:p>
         </p:txBody>
       </p:sp>
@@ -11639,14 +11641,20 @@
           <a:p>
             <a:pPr algn="ctr" defTabSz="685766"/>
             <a:r>
-              <a:rPr lang="en-US" sz="1400" dirty="0">
+              <a:rPr lang="en-US" sz="1400" dirty="0" smtClean="0">
                 <a:solidFill>
                   <a:prstClr val="white"/>
                 </a:solidFill>
                 <a:latin typeface="Calibri"/>
               </a:rPr>
-              <a:t>Course</a:t>
-            </a:r>
+              <a:t>User</a:t>
+            </a:r>
+            <a:endParaRPr lang="en-US" sz="1400" dirty="0">
+              <a:solidFill>
+                <a:prstClr val="white"/>
+              </a:solidFill>
+              <a:latin typeface="Calibri"/>
+            </a:endParaRPr>
           </a:p>
         </p:txBody>
       </p:sp>
@@ -11658,7 +11666,7 @@
         </p:nvSpPr>
         <p:spPr>
           <a:xfrm>
-            <a:off x="2524993" y="2770157"/>
+            <a:off x="4418734" y="2770157"/>
             <a:ext cx="1636568" cy="506557"/>
           </a:xfrm>
           <a:prstGeom prst="rect">
@@ -11775,14 +11783,14 @@
         <p:nvCxnSpPr>
           <p:cNvPr id="22" name="Straight Arrow Connector 21"/>
           <p:cNvCxnSpPr>
-            <a:stCxn id="9" idx="2"/>
+            <a:stCxn id="10" idx="2"/>
             <a:endCxn id="11" idx="0"/>
           </p:cNvCxnSpPr>
           <p:nvPr/>
         </p:nvCxnSpPr>
         <p:spPr>
           <a:xfrm>
-            <a:off x="3343275" y="2428878"/>
+            <a:off x="5237018" y="2428878"/>
             <a:ext cx="0" cy="341279"/>
           </a:xfrm>
           <a:prstGeom prst="straightConnector1">
@@ -11820,7 +11828,7 @@
   <p:timing>
     <p:tnLst>
       <p:par>
-        <p:cTn xmlns:p14="http://schemas.microsoft.com/office/powerpoint/2010/main" id="1" dur="indefinite" restart="never" nodeType="tmRoot"/>
+        <p:cTn id="1" dur="indefinite" restart="never" nodeType="tmRoot"/>
       </p:par>
     </p:tnLst>
   </p:timing>
@@ -11972,7 +11980,7 @@
   <p:timing>
     <p:tnLst>
       <p:par>
-        <p:cTn xmlns:p14="http://schemas.microsoft.com/office/powerpoint/2010/main" id="1" dur="indefinite" restart="never" nodeType="tmRoot"/>
+        <p:cTn id="1" dur="indefinite" restart="never" nodeType="tmRoot"/>
       </p:par>
     </p:tnLst>
   </p:timing>
@@ -12083,14 +12091,7 @@
                 <a:latin typeface="Calibri Light"/>
                 <a:cs typeface="Calibri Light"/>
               </a:rPr>
-              <a:t>Search feature to find out if ther</a:t>
-            </a:r>
-            <a:r>
-              <a:rPr lang="en-US" sz="3000" dirty="0" smtClean="0">
-                <a:latin typeface="Calibri Light"/>
-                <a:cs typeface="Calibri Light"/>
-              </a:rPr>
-              <a:t>e is a particular course</a:t>
+              <a:t>Search feature to find out if there is a particular course</a:t>
             </a:r>
           </a:p>
           <a:p>
@@ -12125,7 +12126,7 @@
   <p:timing>
     <p:tnLst>
       <p:par>
-        <p:cTn xmlns:p14="http://schemas.microsoft.com/office/powerpoint/2010/main" id="1" dur="indefinite" restart="never" nodeType="tmRoot"/>
+        <p:cTn id="1" dur="indefinite" restart="never" nodeType="tmRoot"/>
       </p:par>
     </p:tnLst>
   </p:timing>
@@ -12229,14 +12230,7 @@
                 <a:latin typeface="Calibri Light"/>
                 <a:cs typeface="Calibri Light"/>
               </a:rPr>
-              <a:t>Search feature to find out if ther</a:t>
-            </a:r>
-            <a:r>
-              <a:rPr lang="en-US" sz="3000" dirty="0" smtClean="0">
-                <a:latin typeface="Calibri Light"/>
-                <a:cs typeface="Calibri Light"/>
-              </a:rPr>
-              <a:t>e is a particular course</a:t>
+              <a:t>Search feature to find out if there is a particular course</a:t>
             </a:r>
           </a:p>
           <a:p>
@@ -12284,7 +12278,7 @@
   <p:timing>
     <p:tnLst>
       <p:par>
-        <p:cTn xmlns:p14="http://schemas.microsoft.com/office/powerpoint/2010/main" id="1" dur="indefinite" restart="never" nodeType="tmRoot"/>
+        <p:cTn id="1" dur="indefinite" restart="never" nodeType="tmRoot"/>
       </p:par>
     </p:tnLst>
   </p:timing>
@@ -12812,7 +12806,7 @@
   <a:extraClrSchemeLst/>
   <a:extLst>
     <a:ext uri="{05A4C25C-085E-4340-85A3-A5531E510DB2}">
-      <thm15:themeFamily xmlns:thm15="http://schemas.microsoft.com/office/thememl/2012/main" xmlns="" name="Office Theme" id="{62F939B6-93AF-4DB8-9C6B-D6C7DFDC589F}" vid="{4A3C46E8-61CC-4603-A589-7422A47A8E4A}"/>
+      <thm15:themeFamily xmlns:thm15="http://schemas.microsoft.com/office/thememl/2012/main" name="Office Theme" id="{62F939B6-93AF-4DB8-9C6B-D6C7DFDC589F}" vid="{4A3C46E8-61CC-4603-A589-7422A47A8E4A}"/>
     </a:ext>
   </a:extLst>
 </a:theme>
@@ -13073,7 +13067,7 @@
   <a:extraClrSchemeLst/>
   <a:extLst>
     <a:ext uri="{05A4C25C-085E-4340-85A3-A5531E510DB2}">
-      <thm15:themeFamily xmlns:thm15="http://schemas.microsoft.com/office/thememl/2012/main" xmlns="" name="Office Theme" id="{62F939B6-93AF-4DB8-9C6B-D6C7DFDC589F}" vid="{4A3C46E8-61CC-4603-A589-7422A47A8E4A}"/>
+      <thm15:themeFamily xmlns:thm15="http://schemas.microsoft.com/office/thememl/2012/main" name="Office Theme" id="{62F939B6-93AF-4DB8-9C6B-D6C7DFDC589F}" vid="{4A3C46E8-61CC-4603-A589-7422A47A8E4A}"/>
     </a:ext>
   </a:extLst>
 </a:theme>
@@ -13334,7 +13328,7 @@
   <a:extraClrSchemeLst/>
   <a:extLst>
     <a:ext uri="{05A4C25C-085E-4340-85A3-A5531E510DB2}">
-      <thm15:themeFamily xmlns:thm15="http://schemas.microsoft.com/office/thememl/2012/main" xmlns="" name="Office Theme" id="{62F939B6-93AF-4DB8-9C6B-D6C7DFDC589F}" vid="{4A3C46E8-61CC-4603-A589-7422A47A8E4A}"/>
+      <thm15:themeFamily xmlns:thm15="http://schemas.microsoft.com/office/thememl/2012/main" name="Office Theme" id="{62F939B6-93AF-4DB8-9C6B-D6C7DFDC589F}" vid="{4A3C46E8-61CC-4603-A589-7422A47A8E4A}"/>
     </a:ext>
   </a:extLst>
 </a:theme>

</xml_diff>

<commit_message>
Minor change to final presentation slides.
</commit_message>
<xml_diff>
--- a/Course_Avail_Final.pptx
+++ b/Course_Avail_Final.pptx
@@ -118,7 +118,7 @@
   </p:defaultTextStyle>
   <p:extLst>
     <p:ext uri="{EFAFB233-063F-42B5-8137-9DF3F51BA10A}">
-      <p15:sldGuideLst xmlns:p15="http://schemas.microsoft.com/office/powerpoint/2012/main">
+      <p15:sldGuideLst xmlns:p15="http://schemas.microsoft.com/office/powerpoint/2012/main" xmlns="">
         <p15:guide id="1" orient="horz" pos="1620">
           <p15:clr>
             <a:srgbClr val="A4A3A4"/>
@@ -218,7 +218,7 @@
             <a:fld id="{A37281A0-962A-47F4-9481-A75AEA6E69B5}" type="datetimeFigureOut">
               <a:rPr lang="en-US" smtClean="0"/>
               <a:pPr/>
-              <a:t>12/10/2013</a:t>
+              <a:t>12/10/13</a:t>
             </a:fld>
             <a:endParaRPr lang="en-US"/>
           </a:p>
@@ -864,7 +864,7 @@
             <a:fld id="{B01F9CA3-105E-4857-9057-6DB6197DA786}" type="datetimeFigureOut">
               <a:rPr lang="en-US" smtClean="0"/>
               <a:pPr/>
-              <a:t>12/10/2013</a:t>
+              <a:t>12/10/13</a:t>
             </a:fld>
             <a:endParaRPr lang="en-US"/>
           </a:p>
@@ -1058,7 +1058,7 @@
             <a:fld id="{B01F9CA3-105E-4857-9057-6DB6197DA786}" type="datetimeFigureOut">
               <a:rPr lang="en-US" smtClean="0"/>
               <a:pPr/>
-              <a:t>12/10/2013</a:t>
+              <a:t>12/10/13</a:t>
             </a:fld>
             <a:endParaRPr lang="en-US"/>
           </a:p>
@@ -1329,7 +1329,7 @@
             <a:fld id="{B01F9CA3-105E-4857-9057-6DB6197DA786}" type="datetimeFigureOut">
               <a:rPr lang="en-US" smtClean="0"/>
               <a:pPr/>
-              <a:t>12/10/2013</a:t>
+              <a:t>12/10/13</a:t>
             </a:fld>
             <a:endParaRPr lang="en-US"/>
           </a:p>
@@ -1510,7 +1510,7 @@
             <a:fld id="{B01F9CA3-105E-4857-9057-6DB6197DA786}" type="datetimeFigureOut">
               <a:rPr lang="en-US" smtClean="0"/>
               <a:pPr/>
-              <a:t>12/10/2013</a:t>
+              <a:t>12/10/13</a:t>
             </a:fld>
             <a:endParaRPr lang="en-US"/>
           </a:p>
@@ -1706,7 +1706,7 @@
                 <a:latin typeface="Calibri"/>
               </a:rPr>
               <a:pPr/>
-              <a:t>12/10/2013</a:t>
+              <a:t>12/10/13</a:t>
             </a:fld>
             <a:endParaRPr lang="en-US">
               <a:solidFill>
@@ -1913,7 +1913,7 @@
                 <a:latin typeface="Calibri"/>
               </a:rPr>
               <a:pPr/>
-              <a:t>12/10/2013</a:t>
+              <a:t>12/10/13</a:t>
             </a:fld>
             <a:endParaRPr lang="en-US">
               <a:solidFill>
@@ -2196,7 +2196,7 @@
                 <a:latin typeface="Calibri"/>
               </a:rPr>
               <a:pPr/>
-              <a:t>12/10/2013</a:t>
+              <a:t>12/10/13</a:t>
             </a:fld>
             <a:endParaRPr lang="en-US">
               <a:solidFill>
@@ -2465,7 +2465,7 @@
                 <a:latin typeface="Calibri"/>
               </a:rPr>
               <a:pPr/>
-              <a:t>12/10/2013</a:t>
+              <a:t>12/10/13</a:t>
             </a:fld>
             <a:endParaRPr lang="en-US">
               <a:solidFill>
@@ -2869,7 +2869,7 @@
                 <a:latin typeface="Calibri"/>
               </a:rPr>
               <a:pPr/>
-              <a:t>12/10/2013</a:t>
+              <a:t>12/10/13</a:t>
             </a:fld>
             <a:endParaRPr lang="en-US">
               <a:solidFill>
@@ -3024,7 +3024,7 @@
                 <a:latin typeface="Calibri"/>
               </a:rPr>
               <a:pPr/>
-              <a:t>12/10/2013</a:t>
+              <a:t>12/10/13</a:t>
             </a:fld>
             <a:endParaRPr lang="en-US">
               <a:solidFill>
@@ -3156,7 +3156,7 @@
                 <a:latin typeface="Calibri"/>
               </a:rPr>
               <a:pPr/>
-              <a:t>12/10/2013</a:t>
+              <a:t>12/10/13</a:t>
             </a:fld>
             <a:endParaRPr lang="en-US">
               <a:solidFill>
@@ -3360,7 +3360,7 @@
             <a:fld id="{B01F9CA3-105E-4857-9057-6DB6197DA786}" type="datetimeFigureOut">
               <a:rPr lang="en-US" smtClean="0"/>
               <a:pPr/>
-              <a:t>12/10/2013</a:t>
+              <a:t>12/10/13</a:t>
             </a:fld>
             <a:endParaRPr lang="en-US"/>
           </a:p>
@@ -3641,7 +3641,7 @@
                 <a:latin typeface="Calibri"/>
               </a:rPr>
               <a:pPr/>
-              <a:t>12/10/2013</a:t>
+              <a:t>12/10/13</a:t>
             </a:fld>
             <a:endParaRPr lang="en-US">
               <a:solidFill>
@@ -3931,7 +3931,7 @@
                 <a:latin typeface="Calibri"/>
               </a:rPr>
               <a:pPr/>
-              <a:t>12/10/2013</a:t>
+              <a:t>12/10/13</a:t>
             </a:fld>
             <a:endParaRPr lang="en-US">
               <a:solidFill>
@@ -4138,7 +4138,7 @@
                 <a:latin typeface="Calibri"/>
               </a:rPr>
               <a:pPr/>
-              <a:t>12/10/2013</a:t>
+              <a:t>12/10/13</a:t>
             </a:fld>
             <a:endParaRPr lang="en-US">
               <a:solidFill>
@@ -4355,7 +4355,7 @@
                 <a:latin typeface="Calibri"/>
               </a:rPr>
               <a:pPr/>
-              <a:t>12/10/2013</a:t>
+              <a:t>12/10/13</a:t>
             </a:fld>
             <a:endParaRPr lang="en-US">
               <a:solidFill>
@@ -4584,7 +4584,7 @@
                 <a:latin typeface="Calibri"/>
               </a:rPr>
               <a:pPr/>
-              <a:t>12/10/2013</a:t>
+              <a:t>12/10/13</a:t>
             </a:fld>
             <a:endParaRPr lang="en-US">
               <a:solidFill>
@@ -4791,7 +4791,7 @@
                 <a:latin typeface="Calibri"/>
               </a:rPr>
               <a:pPr/>
-              <a:t>12/10/2013</a:t>
+              <a:t>12/10/13</a:t>
             </a:fld>
             <a:endParaRPr lang="en-US">
               <a:solidFill>
@@ -5074,7 +5074,7 @@
                 <a:latin typeface="Calibri"/>
               </a:rPr>
               <a:pPr/>
-              <a:t>12/10/2013</a:t>
+              <a:t>12/10/13</a:t>
             </a:fld>
             <a:endParaRPr lang="en-US">
               <a:solidFill>
@@ -5343,7 +5343,7 @@
                 <a:latin typeface="Calibri"/>
               </a:rPr>
               <a:pPr/>
-              <a:t>12/10/2013</a:t>
+              <a:t>12/10/13</a:t>
             </a:fld>
             <a:endParaRPr lang="en-US">
               <a:solidFill>
@@ -5747,7 +5747,7 @@
                 <a:latin typeface="Calibri"/>
               </a:rPr>
               <a:pPr/>
-              <a:t>12/10/2013</a:t>
+              <a:t>12/10/13</a:t>
             </a:fld>
             <a:endParaRPr lang="en-US">
               <a:solidFill>
@@ -5902,7 +5902,7 @@
                 <a:latin typeface="Calibri"/>
               </a:rPr>
               <a:pPr/>
-              <a:t>12/10/2013</a:t>
+              <a:t>12/10/13</a:t>
             </a:fld>
             <a:endParaRPr lang="en-US">
               <a:solidFill>
@@ -6179,7 +6179,7 @@
             <a:fld id="{B01F9CA3-105E-4857-9057-6DB6197DA786}" type="datetimeFigureOut">
               <a:rPr lang="en-US" smtClean="0"/>
               <a:pPr/>
-              <a:t>12/10/2013</a:t>
+              <a:t>12/10/13</a:t>
             </a:fld>
             <a:endParaRPr lang="en-US"/>
           </a:p>
@@ -6355,7 +6355,7 @@
                 <a:latin typeface="Calibri"/>
               </a:rPr>
               <a:pPr/>
-              <a:t>12/10/2013</a:t>
+              <a:t>12/10/13</a:t>
             </a:fld>
             <a:endParaRPr lang="en-US">
               <a:solidFill>
@@ -6669,7 +6669,7 @@
                 <a:latin typeface="Calibri"/>
               </a:rPr>
               <a:pPr/>
-              <a:t>12/10/2013</a:t>
+              <a:t>12/10/13</a:t>
             </a:fld>
             <a:endParaRPr lang="en-US">
               <a:solidFill>
@@ -6959,7 +6959,7 @@
                 <a:latin typeface="Calibri"/>
               </a:rPr>
               <a:pPr/>
-              <a:t>12/10/2013</a:t>
+              <a:t>12/10/13</a:t>
             </a:fld>
             <a:endParaRPr lang="en-US">
               <a:solidFill>
@@ -7166,7 +7166,7 @@
                 <a:latin typeface="Calibri"/>
               </a:rPr>
               <a:pPr/>
-              <a:t>12/10/2013</a:t>
+              <a:t>12/10/13</a:t>
             </a:fld>
             <a:endParaRPr lang="en-US">
               <a:solidFill>
@@ -7383,7 +7383,7 @@
                 <a:latin typeface="Calibri"/>
               </a:rPr>
               <a:pPr/>
-              <a:t>12/10/2013</a:t>
+              <a:t>12/10/13</a:t>
             </a:fld>
             <a:endParaRPr lang="en-US">
               <a:solidFill>
@@ -7664,7 +7664,7 @@
             <a:fld id="{B01F9CA3-105E-4857-9057-6DB6197DA786}" type="datetimeFigureOut">
               <a:rPr lang="en-US" smtClean="0"/>
               <a:pPr/>
-              <a:t>12/10/2013</a:t>
+              <a:t>12/10/13</a:t>
             </a:fld>
             <a:endParaRPr lang="en-US"/>
           </a:p>
@@ -7964,7 +7964,7 @@
             <a:fld id="{B01F9CA3-105E-4857-9057-6DB6197DA786}" type="datetimeFigureOut">
               <a:rPr lang="en-US" smtClean="0"/>
               <a:pPr/>
-              <a:t>12/10/2013</a:t>
+              <a:t>12/10/13</a:t>
             </a:fld>
             <a:endParaRPr lang="en-US"/>
           </a:p>
@@ -8422,7 +8422,7 @@
             <a:fld id="{B01F9CA3-105E-4857-9057-6DB6197DA786}" type="datetimeFigureOut">
               <a:rPr lang="en-US" smtClean="0"/>
               <a:pPr/>
-              <a:t>12/10/2013</a:t>
+              <a:t>12/10/13</a:t>
             </a:fld>
             <a:endParaRPr lang="en-US"/>
           </a:p>
@@ -8537,7 +8537,7 @@
             <a:fld id="{B01F9CA3-105E-4857-9057-6DB6197DA786}" type="datetimeFigureOut">
               <a:rPr lang="en-US" smtClean="0"/>
               <a:pPr/>
-              <a:t>12/10/2013</a:t>
+              <a:t>12/10/13</a:t>
             </a:fld>
             <a:endParaRPr lang="en-US"/>
           </a:p>
@@ -8629,7 +8629,7 @@
             <a:fld id="{B01F9CA3-105E-4857-9057-6DB6197DA786}" type="datetimeFigureOut">
               <a:rPr lang="en-US" smtClean="0"/>
               <a:pPr/>
-              <a:t>12/10/2013</a:t>
+              <a:t>12/10/13</a:t>
             </a:fld>
             <a:endParaRPr lang="en-US"/>
           </a:p>
@@ -8913,7 +8913,7 @@
             <a:fld id="{B01F9CA3-105E-4857-9057-6DB6197DA786}" type="datetimeFigureOut">
               <a:rPr lang="en-US" smtClean="0"/>
               <a:pPr/>
-              <a:t>12/10/2013</a:t>
+              <a:t>12/10/13</a:t>
             </a:fld>
             <a:endParaRPr lang="en-US"/>
           </a:p>
@@ -9126,7 +9126,7 @@
             <a:fld id="{B01F9CA3-105E-4857-9057-6DB6197DA786}" type="datetimeFigureOut">
               <a:rPr lang="en-US" smtClean="0"/>
               <a:pPr/>
-              <a:t>12/10/2013</a:t>
+              <a:t>12/10/13</a:t>
             </a:fld>
             <a:endParaRPr lang="en-US"/>
           </a:p>
@@ -9725,7 +9725,7 @@
                 <a:latin typeface="Calibri"/>
               </a:rPr>
               <a:pPr defTabSz="685783"/>
-              <a:t>12/10/2013</a:t>
+              <a:t>12/10/13</a:t>
             </a:fld>
             <a:endParaRPr lang="en-US">
               <a:solidFill>
@@ -10310,7 +10310,7 @@
                 <a:latin typeface="Calibri"/>
               </a:rPr>
               <a:pPr defTabSz="685800"/>
-              <a:t>12/10/2013</a:t>
+              <a:t>12/10/13</a:t>
             </a:fld>
             <a:endParaRPr lang="en-US">
               <a:solidFill>
@@ -11098,7 +11098,7 @@
   <p:timing>
     <p:tnLst>
       <p:par>
-        <p:cTn id="1" dur="indefinite" restart="never" nodeType="tmRoot"/>
+        <p:cTn xmlns:p14="http://schemas.microsoft.com/office/powerpoint/2010/main" id="1" dur="indefinite" restart="never" nodeType="tmRoot"/>
       </p:par>
     </p:tnLst>
   </p:timing>
@@ -11207,7 +11207,7 @@
   <p:timing>
     <p:tnLst>
       <p:par>
-        <p:cTn id="1" dur="indefinite" restart="never" nodeType="tmRoot"/>
+        <p:cTn xmlns:p14="http://schemas.microsoft.com/office/powerpoint/2010/main" id="1" dur="indefinite" restart="never" nodeType="tmRoot"/>
       </p:par>
     </p:tnLst>
   </p:timing>
@@ -11311,7 +11311,7 @@
   <p:timing>
     <p:tnLst>
       <p:par>
-        <p:cTn id="1" dur="indefinite" restart="never" nodeType="tmRoot"/>
+        <p:cTn xmlns:p14="http://schemas.microsoft.com/office/powerpoint/2010/main" id="1" dur="indefinite" restart="never" nodeType="tmRoot"/>
       </p:par>
     </p:tnLst>
   </p:timing>
@@ -11455,7 +11455,7 @@
   <p:timing>
     <p:tnLst>
       <p:par>
-        <p:cTn id="1" dur="indefinite" restart="never" nodeType="tmRoot"/>
+        <p:cTn xmlns:p14="http://schemas.microsoft.com/office/powerpoint/2010/main" id="1" dur="indefinite" restart="never" nodeType="tmRoot"/>
       </p:par>
     </p:tnLst>
   </p:timing>
@@ -11828,7 +11828,7 @@
   <p:timing>
     <p:tnLst>
       <p:par>
-        <p:cTn id="1" dur="indefinite" restart="never" nodeType="tmRoot"/>
+        <p:cTn xmlns:p14="http://schemas.microsoft.com/office/powerpoint/2010/main" id="1" dur="indefinite" restart="never" nodeType="tmRoot"/>
       </p:par>
     </p:tnLst>
   </p:timing>
@@ -11897,7 +11897,7 @@
         <p:spPr>
           <a:xfrm>
             <a:off x="903112" y="1248834"/>
-            <a:ext cx="7874001" cy="1938990"/>
+            <a:ext cx="7874001" cy="2400655"/>
           </a:xfrm>
           <a:prstGeom prst="rect">
             <a:avLst/>
@@ -11915,7 +11915,21 @@
                 <a:latin typeface="Calibri Light"/>
                 <a:cs typeface="Calibri Light"/>
               </a:rPr>
-              <a:t>Initialized code to be executed without user sign-in. Then go through database to check whether any classes have changed class, and also check whether any users are checking those classes.</a:t>
+              <a:t>Initialized code to be executed without user sign-in. Then go through database to check whether any classes have changed </a:t>
+            </a:r>
+            <a:r>
+              <a:rPr lang="en-US" sz="3000" dirty="0" smtClean="0">
+                <a:latin typeface="Calibri Light"/>
+                <a:cs typeface="Calibri Light"/>
+              </a:rPr>
+              <a:t>in amount of seats, </a:t>
+            </a:r>
+            <a:r>
+              <a:rPr lang="en-US" sz="3000" dirty="0" smtClean="0">
+                <a:latin typeface="Calibri Light"/>
+                <a:cs typeface="Calibri Light"/>
+              </a:rPr>
+              <a:t>and also check whether any users are checking those classes.</a:t>
             </a:r>
             <a:endParaRPr lang="en-US" sz="3000" dirty="0">
               <a:latin typeface="Calibri Light"/>
@@ -11932,7 +11946,7 @@
         </p:nvSpPr>
         <p:spPr>
           <a:xfrm>
-            <a:off x="903112" y="3420459"/>
+            <a:off x="903112" y="3649489"/>
             <a:ext cx="7874001" cy="1015661"/>
           </a:xfrm>
           <a:prstGeom prst="rect">
@@ -11980,7 +11994,7 @@
   <p:timing>
     <p:tnLst>
       <p:par>
-        <p:cTn id="1" dur="indefinite" restart="never" nodeType="tmRoot"/>
+        <p:cTn xmlns:p14="http://schemas.microsoft.com/office/powerpoint/2010/main" id="1" dur="indefinite" restart="never" nodeType="tmRoot"/>
       </p:par>
     </p:tnLst>
   </p:timing>
@@ -12126,7 +12140,7 @@
   <p:timing>
     <p:tnLst>
       <p:par>
-        <p:cTn id="1" dur="indefinite" restart="never" nodeType="tmRoot"/>
+        <p:cTn xmlns:p14="http://schemas.microsoft.com/office/powerpoint/2010/main" id="1" dur="indefinite" restart="never" nodeType="tmRoot"/>
       </p:par>
     </p:tnLst>
   </p:timing>
@@ -12278,7 +12292,7 @@
   <p:timing>
     <p:tnLst>
       <p:par>
-        <p:cTn id="1" dur="indefinite" restart="never" nodeType="tmRoot"/>
+        <p:cTn xmlns:p14="http://schemas.microsoft.com/office/powerpoint/2010/main" id="1" dur="indefinite" restart="never" nodeType="tmRoot"/>
       </p:par>
     </p:tnLst>
   </p:timing>
@@ -12806,7 +12820,7 @@
   <a:extraClrSchemeLst/>
   <a:extLst>
     <a:ext uri="{05A4C25C-085E-4340-85A3-A5531E510DB2}">
-      <thm15:themeFamily xmlns:thm15="http://schemas.microsoft.com/office/thememl/2012/main" name="Office Theme" id="{62F939B6-93AF-4DB8-9C6B-D6C7DFDC589F}" vid="{4A3C46E8-61CC-4603-A589-7422A47A8E4A}"/>
+      <thm15:themeFamily xmlns:thm15="http://schemas.microsoft.com/office/thememl/2012/main" xmlns="" name="Office Theme" id="{62F939B6-93AF-4DB8-9C6B-D6C7DFDC589F}" vid="{4A3C46E8-61CC-4603-A589-7422A47A8E4A}"/>
     </a:ext>
   </a:extLst>
 </a:theme>
@@ -13067,7 +13081,7 @@
   <a:extraClrSchemeLst/>
   <a:extLst>
     <a:ext uri="{05A4C25C-085E-4340-85A3-A5531E510DB2}">
-      <thm15:themeFamily xmlns:thm15="http://schemas.microsoft.com/office/thememl/2012/main" name="Office Theme" id="{62F939B6-93AF-4DB8-9C6B-D6C7DFDC589F}" vid="{4A3C46E8-61CC-4603-A589-7422A47A8E4A}"/>
+      <thm15:themeFamily xmlns:thm15="http://schemas.microsoft.com/office/thememl/2012/main" xmlns="" name="Office Theme" id="{62F939B6-93AF-4DB8-9C6B-D6C7DFDC589F}" vid="{4A3C46E8-61CC-4603-A589-7422A47A8E4A}"/>
     </a:ext>
   </a:extLst>
 </a:theme>
@@ -13328,7 +13342,7 @@
   <a:extraClrSchemeLst/>
   <a:extLst>
     <a:ext uri="{05A4C25C-085E-4340-85A3-A5531E510DB2}">
-      <thm15:themeFamily xmlns:thm15="http://schemas.microsoft.com/office/thememl/2012/main" name="Office Theme" id="{62F939B6-93AF-4DB8-9C6B-D6C7DFDC589F}" vid="{4A3C46E8-61CC-4603-A589-7422A47A8E4A}"/>
+      <thm15:themeFamily xmlns:thm15="http://schemas.microsoft.com/office/thememl/2012/main" xmlns="" name="Office Theme" id="{62F939B6-93AF-4DB8-9C6B-D6C7DFDC589F}" vid="{4A3C46E8-61CC-4603-A589-7422A47A8E4A}"/>
     </a:ext>
   </a:extLst>
 </a:theme>

</xml_diff>

<commit_message>
No changes, but git hub seems to complain about final presentation PowerPoint have changes.
</commit_message>
<xml_diff>
--- a/Course_Avail_Final.pptx
+++ b/Course_Avail_Final.pptx
@@ -488,6 +488,211 @@
 </file>
 
 <file path=ppt/notesSlides/notesSlide1.xml><?xml version="1.0" encoding="utf-8"?>
+<p:notes xmlns:a="http://schemas.openxmlformats.org/drawingml/2006/main" xmlns:r="http://schemas.openxmlformats.org/officeDocument/2006/relationships" xmlns:p="http://schemas.openxmlformats.org/presentationml/2006/main">
+  <p:cSld>
+    <p:spTree>
+      <p:nvGrpSpPr>
+        <p:cNvPr id="1" name=""/>
+        <p:cNvGrpSpPr/>
+        <p:nvPr/>
+      </p:nvGrpSpPr>
+      <p:grpSpPr>
+        <a:xfrm>
+          <a:off x="0" y="0"/>
+          <a:ext cx="0" cy="0"/>
+          <a:chOff x="0" y="0"/>
+          <a:chExt cx="0" cy="0"/>
+        </a:xfrm>
+      </p:grpSpPr>
+      <p:sp>
+        <p:nvSpPr>
+          <p:cNvPr id="2" name="Slide Image Placeholder 1"/>
+          <p:cNvSpPr>
+            <a:spLocks noGrp="1" noRot="1" noChangeAspect="1"/>
+          </p:cNvSpPr>
+          <p:nvPr>
+            <p:ph type="sldImg"/>
+          </p:nvPr>
+        </p:nvSpPr>
+        <p:spPr/>
+      </p:sp>
+      <p:sp>
+        <p:nvSpPr>
+          <p:cNvPr id="3" name="Notes Placeholder 2"/>
+          <p:cNvSpPr>
+            <a:spLocks noGrp="1"/>
+          </p:cNvSpPr>
+          <p:nvPr>
+            <p:ph type="body" idx="1"/>
+          </p:nvPr>
+        </p:nvSpPr>
+        <p:spPr/>
+        <p:txBody>
+          <a:bodyPr/>
+          <a:lstStyle/>
+          <a:p>
+            <a:r>
+              <a:rPr lang="en-US" dirty="0" smtClean="0"/>
+              <a:t>Concept or idea of this project is to have the</a:t>
+            </a:r>
+            <a:r>
+              <a:rPr lang="en-US" baseline="0" dirty="0" smtClean="0"/>
+              <a:t> website grab information from the UH Course website, then allow users to track the course and be notified</a:t>
+            </a:r>
+            <a:br>
+              <a:rPr lang="en-US" baseline="0" dirty="0" smtClean="0"/>
+            </a:br>
+            <a:r>
+              <a:rPr lang="en-US" baseline="0" dirty="0" smtClean="0"/>
+              <a:t>if the seats changes</a:t>
+            </a:r>
+            <a:endParaRPr lang="en-US" dirty="0"/>
+          </a:p>
+        </p:txBody>
+      </p:sp>
+      <p:sp>
+        <p:nvSpPr>
+          <p:cNvPr id="4" name="Slide Number Placeholder 3"/>
+          <p:cNvSpPr>
+            <a:spLocks noGrp="1"/>
+          </p:cNvSpPr>
+          <p:nvPr>
+            <p:ph type="sldNum" sz="quarter" idx="10"/>
+          </p:nvPr>
+        </p:nvSpPr>
+        <p:spPr/>
+        <p:txBody>
+          <a:bodyPr/>
+          <a:lstStyle/>
+          <a:p>
+            <a:fld id="{3485A29B-357A-4063-A4EA-E6DDBC92BB77}" type="slidenum">
+              <a:rPr lang="en-US" smtClean="0"/>
+              <a:pPr/>
+              <a:t>2</a:t>
+            </a:fld>
+            <a:endParaRPr lang="en-US"/>
+          </a:p>
+        </p:txBody>
+      </p:sp>
+    </p:spTree>
+    <p:extLst>
+      <p:ext uri="{BB962C8B-B14F-4D97-AF65-F5344CB8AC3E}">
+        <p14:creationId xmlns:p14="http://schemas.microsoft.com/office/powerpoint/2010/main" val="505686576"/>
+      </p:ext>
+    </p:extLst>
+  </p:cSld>
+  <p:clrMapOvr>
+    <a:masterClrMapping/>
+  </p:clrMapOvr>
+</p:notes>
+</file>
+
+<file path=ppt/notesSlides/notesSlide2.xml><?xml version="1.0" encoding="utf-8"?>
+<p:notes xmlns:a="http://schemas.openxmlformats.org/drawingml/2006/main" xmlns:r="http://schemas.openxmlformats.org/officeDocument/2006/relationships" xmlns:p="http://schemas.openxmlformats.org/presentationml/2006/main">
+  <p:cSld>
+    <p:spTree>
+      <p:nvGrpSpPr>
+        <p:cNvPr id="1" name=""/>
+        <p:cNvGrpSpPr/>
+        <p:nvPr/>
+      </p:nvGrpSpPr>
+      <p:grpSpPr>
+        <a:xfrm>
+          <a:off x="0" y="0"/>
+          <a:ext cx="0" cy="0"/>
+          <a:chOff x="0" y="0"/>
+          <a:chExt cx="0" cy="0"/>
+        </a:xfrm>
+      </p:grpSpPr>
+      <p:sp>
+        <p:nvSpPr>
+          <p:cNvPr id="2" name="Slide Image Placeholder 1"/>
+          <p:cNvSpPr>
+            <a:spLocks noGrp="1" noRot="1" noChangeAspect="1"/>
+          </p:cNvSpPr>
+          <p:nvPr>
+            <p:ph type="sldImg"/>
+          </p:nvPr>
+        </p:nvSpPr>
+        <p:spPr/>
+      </p:sp>
+      <p:sp>
+        <p:nvSpPr>
+          <p:cNvPr id="3" name="Notes Placeholder 2"/>
+          <p:cNvSpPr>
+            <a:spLocks noGrp="1"/>
+          </p:cNvSpPr>
+          <p:nvPr>
+            <p:ph type="body" idx="1"/>
+          </p:nvPr>
+        </p:nvSpPr>
+        <p:spPr/>
+        <p:txBody>
+          <a:bodyPr/>
+          <a:lstStyle/>
+          <a:p>
+            <a:r>
+              <a:rPr lang="en-US" dirty="0" smtClean="0"/>
+              <a:t>Ruby on Rails – provides an organized structure</a:t>
+            </a:r>
+            <a:r>
+              <a:rPr lang="en-US" baseline="0" dirty="0" smtClean="0"/>
+              <a:t> such as organizing contents in a MVC convention, </a:t>
+            </a:r>
+            <a:r>
+              <a:rPr lang="en-US" baseline="0" dirty="0" err="1" smtClean="0"/>
+              <a:t>css</a:t>
+            </a:r>
+            <a:r>
+              <a:rPr lang="en-US" baseline="0" dirty="0" smtClean="0"/>
+              <a:t> files </a:t>
+            </a:r>
+            <a:r>
+              <a:rPr lang="en-US" baseline="0" smtClean="0"/>
+              <a:t>etc</a:t>
+            </a:r>
+            <a:endParaRPr lang="en-US"/>
+          </a:p>
+        </p:txBody>
+      </p:sp>
+      <p:sp>
+        <p:nvSpPr>
+          <p:cNvPr id="4" name="Slide Number Placeholder 3"/>
+          <p:cNvSpPr>
+            <a:spLocks noGrp="1"/>
+          </p:cNvSpPr>
+          <p:nvPr>
+            <p:ph type="sldNum" sz="quarter" idx="10"/>
+          </p:nvPr>
+        </p:nvSpPr>
+        <p:spPr/>
+        <p:txBody>
+          <a:bodyPr/>
+          <a:lstStyle/>
+          <a:p>
+            <a:fld id="{3485A29B-357A-4063-A4EA-E6DDBC92BB77}" type="slidenum">
+              <a:rPr lang="en-US" smtClean="0"/>
+              <a:pPr/>
+              <a:t>4</a:t>
+            </a:fld>
+            <a:endParaRPr lang="en-US"/>
+          </a:p>
+        </p:txBody>
+      </p:sp>
+    </p:spTree>
+    <p:extLst>
+      <p:ext uri="{BB962C8B-B14F-4D97-AF65-F5344CB8AC3E}">
+        <p14:creationId xmlns:p14="http://schemas.microsoft.com/office/powerpoint/2010/main" val="2446493428"/>
+      </p:ext>
+    </p:extLst>
+  </p:cSld>
+  <p:clrMapOvr>
+    <a:masterClrMapping/>
+  </p:clrMapOvr>
+</p:notes>
+</file>
+
+<file path=ppt/notesSlides/notesSlide3.xml><?xml version="1.0" encoding="utf-8"?>
 <p:notes xmlns:a="http://schemas.openxmlformats.org/drawingml/2006/main" xmlns:r="http://schemas.openxmlformats.org/officeDocument/2006/relationships" xmlns:p="http://schemas.openxmlformats.org/presentationml/2006/main">
   <p:cSld>
     <p:spTree>

</xml_diff>